<commit_message>
Tela de Processos finalizada
</commit_message>
<xml_diff>
--- a/documentacao/Apresentações/Sprint2.pptx
+++ b/documentacao/Apresentações/Sprint2.pptx
@@ -4,6 +4,9 @@
   <p:sldMasterIdLst>
     <p:sldMasterId id="2147483672" r:id="rId1"/>
   </p:sldMasterIdLst>
+  <p:notesMasterIdLst>
+    <p:notesMasterId r:id="rId18"/>
+  </p:notesMasterIdLst>
   <p:sldIdLst>
     <p:sldId id="270" r:id="rId2"/>
     <p:sldId id="257" r:id="rId3"/>
@@ -11,15 +14,16 @@
     <p:sldId id="269" r:id="rId5"/>
     <p:sldId id="263" r:id="rId6"/>
     <p:sldId id="268" r:id="rId7"/>
-    <p:sldId id="262" r:id="rId8"/>
-    <p:sldId id="258" r:id="rId9"/>
-    <p:sldId id="265" r:id="rId10"/>
-    <p:sldId id="260" r:id="rId11"/>
-    <p:sldId id="266" r:id="rId12"/>
-    <p:sldId id="264" r:id="rId13"/>
-    <p:sldId id="271" r:id="rId14"/>
-    <p:sldId id="272" r:id="rId15"/>
-    <p:sldId id="267" r:id="rId16"/>
+    <p:sldId id="273" r:id="rId8"/>
+    <p:sldId id="262" r:id="rId9"/>
+    <p:sldId id="258" r:id="rId10"/>
+    <p:sldId id="265" r:id="rId11"/>
+    <p:sldId id="260" r:id="rId12"/>
+    <p:sldId id="266" r:id="rId13"/>
+    <p:sldId id="264" r:id="rId14"/>
+    <p:sldId id="271" r:id="rId15"/>
+    <p:sldId id="272" r:id="rId16"/>
+    <p:sldId id="267" r:id="rId17"/>
   </p:sldIdLst>
   <p:sldSz cx="12192000" cy="6858000"/>
   <p:notesSz cx="6858000" cy="9144000"/>
@@ -306,6 +310,355 @@
 </p:cmLst>
 </file>
 
+<file path=ppt/notesMasters/notesMaster1.xml><?xml version="1.0" encoding="utf-8"?>
+<p:notesMaster xmlns:a="http://schemas.openxmlformats.org/drawingml/2006/main" xmlns:r="http://schemas.openxmlformats.org/officeDocument/2006/relationships" xmlns:p="http://schemas.openxmlformats.org/presentationml/2006/main">
+  <p:cSld>
+    <p:bg>
+      <p:bgRef idx="1001">
+        <a:schemeClr val="bg1"/>
+      </p:bgRef>
+    </p:bg>
+    <p:spTree>
+      <p:nvGrpSpPr>
+        <p:cNvPr id="1" name=""/>
+        <p:cNvGrpSpPr/>
+        <p:nvPr/>
+      </p:nvGrpSpPr>
+      <p:grpSpPr>
+        <a:xfrm>
+          <a:off x="0" y="0"/>
+          <a:ext cx="0" cy="0"/>
+          <a:chOff x="0" y="0"/>
+          <a:chExt cx="0" cy="0"/>
+        </a:xfrm>
+      </p:grpSpPr>
+      <p:sp>
+        <p:nvSpPr>
+          <p:cNvPr id="2" name="Espaço Reservado para Cabeçalho 1"/>
+          <p:cNvSpPr>
+            <a:spLocks noGrp="1"/>
+          </p:cNvSpPr>
+          <p:nvPr>
+            <p:ph type="hdr" sz="quarter"/>
+          </p:nvPr>
+        </p:nvSpPr>
+        <p:spPr>
+          <a:xfrm>
+            <a:off x="0" y="0"/>
+            <a:ext cx="2971800" cy="458788"/>
+          </a:xfrm>
+          <a:prstGeom prst="rect">
+            <a:avLst/>
+          </a:prstGeom>
+        </p:spPr>
+        <p:txBody>
+          <a:bodyPr vert="horz" lIns="91440" tIns="45720" rIns="91440" bIns="45720" rtlCol="0"/>
+          <a:lstStyle>
+            <a:lvl1pPr algn="l">
+              <a:defRPr sz="1200"/>
+            </a:lvl1pPr>
+          </a:lstStyle>
+          <a:p>
+            <a:endParaRPr lang="pt-BR"/>
+          </a:p>
+        </p:txBody>
+      </p:sp>
+      <p:sp>
+        <p:nvSpPr>
+          <p:cNvPr id="3" name="Espaço Reservado para Data 2"/>
+          <p:cNvSpPr>
+            <a:spLocks noGrp="1"/>
+          </p:cNvSpPr>
+          <p:nvPr>
+            <p:ph type="dt" idx="1"/>
+          </p:nvPr>
+        </p:nvSpPr>
+        <p:spPr>
+          <a:xfrm>
+            <a:off x="3884613" y="0"/>
+            <a:ext cx="2971800" cy="458788"/>
+          </a:xfrm>
+          <a:prstGeom prst="rect">
+            <a:avLst/>
+          </a:prstGeom>
+        </p:spPr>
+        <p:txBody>
+          <a:bodyPr vert="horz" lIns="91440" tIns="45720" rIns="91440" bIns="45720" rtlCol="0"/>
+          <a:lstStyle>
+            <a:lvl1pPr algn="r">
+              <a:defRPr sz="1200"/>
+            </a:lvl1pPr>
+          </a:lstStyle>
+          <a:p>
+            <a:fld id="{6B8A6EFA-F786-4350-B5C0-B2D15D16C623}" type="datetimeFigureOut">
+              <a:rPr lang="pt-BR" smtClean="0"/>
+              <a:t>07/05/2020</a:t>
+            </a:fld>
+            <a:endParaRPr lang="pt-BR"/>
+          </a:p>
+        </p:txBody>
+      </p:sp>
+      <p:sp>
+        <p:nvSpPr>
+          <p:cNvPr id="4" name="Espaço Reservado para Imagem de Slide 3"/>
+          <p:cNvSpPr>
+            <a:spLocks noGrp="1" noRot="1" noChangeAspect="1"/>
+          </p:cNvSpPr>
+          <p:nvPr>
+            <p:ph type="sldImg" idx="2"/>
+          </p:nvPr>
+        </p:nvSpPr>
+        <p:spPr>
+          <a:xfrm>
+            <a:off x="685800" y="1143000"/>
+            <a:ext cx="5486400" cy="3086100"/>
+          </a:xfrm>
+          <a:prstGeom prst="rect">
+            <a:avLst/>
+          </a:prstGeom>
+          <a:noFill/>
+          <a:ln w="12700">
+            <a:solidFill>
+              <a:prstClr val="black"/>
+            </a:solidFill>
+          </a:ln>
+        </p:spPr>
+        <p:txBody>
+          <a:bodyPr vert="horz" lIns="91440" tIns="45720" rIns="91440" bIns="45720" rtlCol="0" anchor="ctr"/>
+          <a:lstStyle/>
+          <a:p>
+            <a:endParaRPr lang="pt-BR"/>
+          </a:p>
+        </p:txBody>
+      </p:sp>
+      <p:sp>
+        <p:nvSpPr>
+          <p:cNvPr id="5" name="Espaço Reservado para Anotações 4"/>
+          <p:cNvSpPr>
+            <a:spLocks noGrp="1"/>
+          </p:cNvSpPr>
+          <p:nvPr>
+            <p:ph type="body" sz="quarter" idx="3"/>
+          </p:nvPr>
+        </p:nvSpPr>
+        <p:spPr>
+          <a:xfrm>
+            <a:off x="685800" y="4400550"/>
+            <a:ext cx="5486400" cy="3600450"/>
+          </a:xfrm>
+          <a:prstGeom prst="rect">
+            <a:avLst/>
+          </a:prstGeom>
+        </p:spPr>
+        <p:txBody>
+          <a:bodyPr vert="horz" lIns="91440" tIns="45720" rIns="91440" bIns="45720" rtlCol="0"/>
+          <a:lstStyle/>
+          <a:p>
+            <a:pPr lvl="0"/>
+            <a:r>
+              <a:rPr lang="pt-BR"/>
+              <a:t>Clique para editar os estilos de texto Mestres</a:t>
+            </a:r>
+          </a:p>
+          <a:p>
+            <a:pPr lvl="1"/>
+            <a:r>
+              <a:rPr lang="pt-BR"/>
+              <a:t>Segundo nível</a:t>
+            </a:r>
+          </a:p>
+          <a:p>
+            <a:pPr lvl="2"/>
+            <a:r>
+              <a:rPr lang="pt-BR"/>
+              <a:t>Terceiro nível</a:t>
+            </a:r>
+          </a:p>
+          <a:p>
+            <a:pPr lvl="3"/>
+            <a:r>
+              <a:rPr lang="pt-BR"/>
+              <a:t>Quarto nível</a:t>
+            </a:r>
+          </a:p>
+          <a:p>
+            <a:pPr lvl="4"/>
+            <a:r>
+              <a:rPr lang="pt-BR"/>
+              <a:t>Quinto nível</a:t>
+            </a:r>
+          </a:p>
+        </p:txBody>
+      </p:sp>
+      <p:sp>
+        <p:nvSpPr>
+          <p:cNvPr id="6" name="Espaço Reservado para Rodapé 5"/>
+          <p:cNvSpPr>
+            <a:spLocks noGrp="1"/>
+          </p:cNvSpPr>
+          <p:nvPr>
+            <p:ph type="ftr" sz="quarter" idx="4"/>
+          </p:nvPr>
+        </p:nvSpPr>
+        <p:spPr>
+          <a:xfrm>
+            <a:off x="0" y="8685213"/>
+            <a:ext cx="2971800" cy="458787"/>
+          </a:xfrm>
+          <a:prstGeom prst="rect">
+            <a:avLst/>
+          </a:prstGeom>
+        </p:spPr>
+        <p:txBody>
+          <a:bodyPr vert="horz" lIns="91440" tIns="45720" rIns="91440" bIns="45720" rtlCol="0" anchor="b"/>
+          <a:lstStyle>
+            <a:lvl1pPr algn="l">
+              <a:defRPr sz="1200"/>
+            </a:lvl1pPr>
+          </a:lstStyle>
+          <a:p>
+            <a:endParaRPr lang="pt-BR"/>
+          </a:p>
+        </p:txBody>
+      </p:sp>
+      <p:sp>
+        <p:nvSpPr>
+          <p:cNvPr id="7" name="Espaço Reservado para Número de Slide 6"/>
+          <p:cNvSpPr>
+            <a:spLocks noGrp="1"/>
+          </p:cNvSpPr>
+          <p:nvPr>
+            <p:ph type="sldNum" sz="quarter" idx="5"/>
+          </p:nvPr>
+        </p:nvSpPr>
+        <p:spPr>
+          <a:xfrm>
+            <a:off x="3884613" y="8685213"/>
+            <a:ext cx="2971800" cy="458787"/>
+          </a:xfrm>
+          <a:prstGeom prst="rect">
+            <a:avLst/>
+          </a:prstGeom>
+        </p:spPr>
+        <p:txBody>
+          <a:bodyPr vert="horz" lIns="91440" tIns="45720" rIns="91440" bIns="45720" rtlCol="0" anchor="b"/>
+          <a:lstStyle>
+            <a:lvl1pPr algn="r">
+              <a:defRPr sz="1200"/>
+            </a:lvl1pPr>
+          </a:lstStyle>
+          <a:p>
+            <a:fld id="{70F0FE1A-58F5-4EBF-B681-F7E92570042E}" type="slidenum">
+              <a:rPr lang="pt-BR" smtClean="0"/>
+              <a:t>‹nº›</a:t>
+            </a:fld>
+            <a:endParaRPr lang="pt-BR"/>
+          </a:p>
+        </p:txBody>
+      </p:sp>
+    </p:spTree>
+    <p:extLst>
+      <p:ext uri="{BB962C8B-B14F-4D97-AF65-F5344CB8AC3E}">
+        <p14:creationId xmlns:p14="http://schemas.microsoft.com/office/powerpoint/2010/main" val="2957974234"/>
+      </p:ext>
+    </p:extLst>
+  </p:cSld>
+  <p:clrMap bg1="lt1" tx1="dk1" bg2="lt2" tx2="dk2" accent1="accent1" accent2="accent2" accent3="accent3" accent4="accent4" accent5="accent5" accent6="accent6" hlink="hlink" folHlink="folHlink"/>
+  <p:notesStyle>
+    <a:lvl1pPr marL="0" algn="l" defTabSz="914400" rtl="0" eaLnBrk="1" latinLnBrk="0" hangingPunct="1">
+      <a:defRPr sz="1200" kern="1200">
+        <a:solidFill>
+          <a:schemeClr val="tx1"/>
+        </a:solidFill>
+        <a:latin typeface="+mn-lt"/>
+        <a:ea typeface="+mn-ea"/>
+        <a:cs typeface="+mn-cs"/>
+      </a:defRPr>
+    </a:lvl1pPr>
+    <a:lvl2pPr marL="457200" algn="l" defTabSz="914400" rtl="0" eaLnBrk="1" latinLnBrk="0" hangingPunct="1">
+      <a:defRPr sz="1200" kern="1200">
+        <a:solidFill>
+          <a:schemeClr val="tx1"/>
+        </a:solidFill>
+        <a:latin typeface="+mn-lt"/>
+        <a:ea typeface="+mn-ea"/>
+        <a:cs typeface="+mn-cs"/>
+      </a:defRPr>
+    </a:lvl2pPr>
+    <a:lvl3pPr marL="914400" algn="l" defTabSz="914400" rtl="0" eaLnBrk="1" latinLnBrk="0" hangingPunct="1">
+      <a:defRPr sz="1200" kern="1200">
+        <a:solidFill>
+          <a:schemeClr val="tx1"/>
+        </a:solidFill>
+        <a:latin typeface="+mn-lt"/>
+        <a:ea typeface="+mn-ea"/>
+        <a:cs typeface="+mn-cs"/>
+      </a:defRPr>
+    </a:lvl3pPr>
+    <a:lvl4pPr marL="1371600" algn="l" defTabSz="914400" rtl="0" eaLnBrk="1" latinLnBrk="0" hangingPunct="1">
+      <a:defRPr sz="1200" kern="1200">
+        <a:solidFill>
+          <a:schemeClr val="tx1"/>
+        </a:solidFill>
+        <a:latin typeface="+mn-lt"/>
+        <a:ea typeface="+mn-ea"/>
+        <a:cs typeface="+mn-cs"/>
+      </a:defRPr>
+    </a:lvl4pPr>
+    <a:lvl5pPr marL="1828800" algn="l" defTabSz="914400" rtl="0" eaLnBrk="1" latinLnBrk="0" hangingPunct="1">
+      <a:defRPr sz="1200" kern="1200">
+        <a:solidFill>
+          <a:schemeClr val="tx1"/>
+        </a:solidFill>
+        <a:latin typeface="+mn-lt"/>
+        <a:ea typeface="+mn-ea"/>
+        <a:cs typeface="+mn-cs"/>
+      </a:defRPr>
+    </a:lvl5pPr>
+    <a:lvl6pPr marL="2286000" algn="l" defTabSz="914400" rtl="0" eaLnBrk="1" latinLnBrk="0" hangingPunct="1">
+      <a:defRPr sz="1200" kern="1200">
+        <a:solidFill>
+          <a:schemeClr val="tx1"/>
+        </a:solidFill>
+        <a:latin typeface="+mn-lt"/>
+        <a:ea typeface="+mn-ea"/>
+        <a:cs typeface="+mn-cs"/>
+      </a:defRPr>
+    </a:lvl6pPr>
+    <a:lvl7pPr marL="2743200" algn="l" defTabSz="914400" rtl="0" eaLnBrk="1" latinLnBrk="0" hangingPunct="1">
+      <a:defRPr sz="1200" kern="1200">
+        <a:solidFill>
+          <a:schemeClr val="tx1"/>
+        </a:solidFill>
+        <a:latin typeface="+mn-lt"/>
+        <a:ea typeface="+mn-ea"/>
+        <a:cs typeface="+mn-cs"/>
+      </a:defRPr>
+    </a:lvl7pPr>
+    <a:lvl8pPr marL="3200400" algn="l" defTabSz="914400" rtl="0" eaLnBrk="1" latinLnBrk="0" hangingPunct="1">
+      <a:defRPr sz="1200" kern="1200">
+        <a:solidFill>
+          <a:schemeClr val="tx1"/>
+        </a:solidFill>
+        <a:latin typeface="+mn-lt"/>
+        <a:ea typeface="+mn-ea"/>
+        <a:cs typeface="+mn-cs"/>
+      </a:defRPr>
+    </a:lvl8pPr>
+    <a:lvl9pPr marL="3657600" algn="l" defTabSz="914400" rtl="0" eaLnBrk="1" latinLnBrk="0" hangingPunct="1">
+      <a:defRPr sz="1200" kern="1200">
+        <a:solidFill>
+          <a:schemeClr val="tx1"/>
+        </a:solidFill>
+        <a:latin typeface="+mn-lt"/>
+        <a:ea typeface="+mn-ea"/>
+        <a:cs typeface="+mn-cs"/>
+      </a:defRPr>
+    </a:lvl9pPr>
+  </p:notesStyle>
+</p:notesMaster>
+</file>
+
 <file path=ppt/slideLayouts/slideLayout1.xml><?xml version="1.0" encoding="utf-8"?>
 <p:sldLayout xmlns:a="http://schemas.openxmlformats.org/drawingml/2006/main" xmlns:r="http://schemas.openxmlformats.org/officeDocument/2006/relationships" xmlns:p="http://schemas.openxmlformats.org/presentationml/2006/main" type="title" preserve="1">
   <p:cSld name="Slide de Título">
@@ -437,7 +790,7 @@
           <a:p>
             <a:fld id="{04EB4EB8-E196-44D9-8FC3-6021E77C51A4}" type="datetimeFigureOut">
               <a:rPr lang="pt-BR" smtClean="0"/>
-              <a:t>06/05/2020</a:t>
+              <a:t>07/05/2020</a:t>
             </a:fld>
             <a:endParaRPr lang="pt-BR"/>
           </a:p>
@@ -607,7 +960,7 @@
           <a:p>
             <a:fld id="{04EB4EB8-E196-44D9-8FC3-6021E77C51A4}" type="datetimeFigureOut">
               <a:rPr lang="pt-BR" smtClean="0"/>
-              <a:t>06/05/2020</a:t>
+              <a:t>07/05/2020</a:t>
             </a:fld>
             <a:endParaRPr lang="pt-BR"/>
           </a:p>
@@ -787,7 +1140,7 @@
           <a:p>
             <a:fld id="{04EB4EB8-E196-44D9-8FC3-6021E77C51A4}" type="datetimeFigureOut">
               <a:rPr lang="pt-BR" smtClean="0"/>
-              <a:t>06/05/2020</a:t>
+              <a:t>07/05/2020</a:t>
             </a:fld>
             <a:endParaRPr lang="pt-BR"/>
           </a:p>
@@ -957,7 +1310,7 @@
           <a:p>
             <a:fld id="{04EB4EB8-E196-44D9-8FC3-6021E77C51A4}" type="datetimeFigureOut">
               <a:rPr lang="pt-BR" smtClean="0"/>
-              <a:t>06/05/2020</a:t>
+              <a:t>07/05/2020</a:t>
             </a:fld>
             <a:endParaRPr lang="pt-BR"/>
           </a:p>
@@ -1203,7 +1556,7 @@
           <a:p>
             <a:fld id="{04EB4EB8-E196-44D9-8FC3-6021E77C51A4}" type="datetimeFigureOut">
               <a:rPr lang="pt-BR" smtClean="0"/>
-              <a:t>06/05/2020</a:t>
+              <a:t>07/05/2020</a:t>
             </a:fld>
             <a:endParaRPr lang="pt-BR"/>
           </a:p>
@@ -1435,7 +1788,7 @@
           <a:p>
             <a:fld id="{04EB4EB8-E196-44D9-8FC3-6021E77C51A4}" type="datetimeFigureOut">
               <a:rPr lang="pt-BR" smtClean="0"/>
-              <a:t>06/05/2020</a:t>
+              <a:t>07/05/2020</a:t>
             </a:fld>
             <a:endParaRPr lang="pt-BR"/>
           </a:p>
@@ -1802,7 +2155,7 @@
           <a:p>
             <a:fld id="{04EB4EB8-E196-44D9-8FC3-6021E77C51A4}" type="datetimeFigureOut">
               <a:rPr lang="pt-BR" smtClean="0"/>
-              <a:t>06/05/2020</a:t>
+              <a:t>07/05/2020</a:t>
             </a:fld>
             <a:endParaRPr lang="pt-BR"/>
           </a:p>
@@ -1920,7 +2273,7 @@
           <a:p>
             <a:fld id="{04EB4EB8-E196-44D9-8FC3-6021E77C51A4}" type="datetimeFigureOut">
               <a:rPr lang="pt-BR" smtClean="0"/>
-              <a:t>06/05/2020</a:t>
+              <a:t>07/05/2020</a:t>
             </a:fld>
             <a:endParaRPr lang="pt-BR"/>
           </a:p>
@@ -2015,7 +2368,7 @@
           <a:p>
             <a:fld id="{04EB4EB8-E196-44D9-8FC3-6021E77C51A4}" type="datetimeFigureOut">
               <a:rPr lang="pt-BR" smtClean="0"/>
-              <a:t>06/05/2020</a:t>
+              <a:t>07/05/2020</a:t>
             </a:fld>
             <a:endParaRPr lang="pt-BR"/>
           </a:p>
@@ -2292,7 +2645,7 @@
           <a:p>
             <a:fld id="{04EB4EB8-E196-44D9-8FC3-6021E77C51A4}" type="datetimeFigureOut">
               <a:rPr lang="pt-BR" smtClean="0"/>
-              <a:t>06/05/2020</a:t>
+              <a:t>07/05/2020</a:t>
             </a:fld>
             <a:endParaRPr lang="pt-BR"/>
           </a:p>
@@ -2549,7 +2902,7 @@
           <a:p>
             <a:fld id="{04EB4EB8-E196-44D9-8FC3-6021E77C51A4}" type="datetimeFigureOut">
               <a:rPr lang="pt-BR" smtClean="0"/>
-              <a:t>06/05/2020</a:t>
+              <a:t>07/05/2020</a:t>
             </a:fld>
             <a:endParaRPr lang="pt-BR"/>
           </a:p>
@@ -2762,7 +3115,7 @@
           <a:p>
             <a:fld id="{04EB4EB8-E196-44D9-8FC3-6021E77C51A4}" type="datetimeFigureOut">
               <a:rPr lang="pt-BR" smtClean="0"/>
-              <a:t>06/05/2020</a:t>
+              <a:t>07/05/2020</a:t>
             </a:fld>
             <a:endParaRPr lang="pt-BR"/>
           </a:p>
@@ -3345,53 +3698,12 @@
           <a:chExt cx="0" cy="0"/>
         </a:xfrm>
       </p:grpSpPr>
-      <p:sp>
-        <p:nvSpPr>
-          <p:cNvPr id="2" name="Título 1">
-            <a:extLst>
-              <a:ext uri="{FF2B5EF4-FFF2-40B4-BE49-F238E27FC236}">
-                <a16:creationId xmlns:a16="http://schemas.microsoft.com/office/drawing/2014/main" id="{BE6D8F10-9168-4897-A64A-2723EE6250FA}"/>
-              </a:ext>
-            </a:extLst>
-          </p:cNvPr>
-          <p:cNvSpPr>
-            <a:spLocks noGrp="1"/>
-          </p:cNvSpPr>
-          <p:nvPr>
-            <p:ph type="title"/>
-          </p:nvPr>
-        </p:nvSpPr>
-        <p:spPr>
-          <a:xfrm>
-            <a:off x="314779" y="445284"/>
-            <a:ext cx="3848100" cy="758825"/>
-          </a:xfrm>
-        </p:spPr>
-        <p:txBody>
-          <a:bodyPr>
-            <a:normAutofit/>
-          </a:bodyPr>
-          <a:lstStyle/>
-          <a:p>
-            <a:r>
-              <a:rPr lang="pt-BR" sz="3200" dirty="0">
-                <a:solidFill>
-                  <a:srgbClr val="4DB033"/>
-                </a:solidFill>
-                <a:latin typeface="Dubai Medium" panose="020B0603030403030204" pitchFamily="34" charset="-78"/>
-                <a:cs typeface="Dubai Medium" panose="020B0603030403030204" pitchFamily="34" charset="-78"/>
-              </a:rPr>
-              <a:t>Site Institucional</a:t>
-            </a:r>
-          </a:p>
-        </p:txBody>
-      </p:sp>
       <p:pic>
         <p:nvPicPr>
-          <p:cNvPr id="5" name="Espaço Reservado para Conteúdo 4" descr="Uma imagem contendo screenshot, texto&#10;&#10;Descrição gerada automaticamente">
-            <a:extLst>
-              <a:ext uri="{FF2B5EF4-FFF2-40B4-BE49-F238E27FC236}">
-                <a16:creationId xmlns:a16="http://schemas.microsoft.com/office/drawing/2014/main" id="{A5749119-35E4-4619-8C72-F0FC1080B386}"/>
+          <p:cNvPr id="12" name="Espaço Reservado para Conteúdo 11" descr="Tela de celular com texto preto sobre fundo branco&#10;&#10;Descrição gerada automaticamente">
+            <a:extLst>
+              <a:ext uri="{FF2B5EF4-FFF2-40B4-BE49-F238E27FC236}">
+                <a16:creationId xmlns:a16="http://schemas.microsoft.com/office/drawing/2014/main" id="{15E3F733-7528-4B05-BCE5-0A3FBA8E6B20}"/>
               </a:ext>
             </a:extLst>
           </p:cNvPr>
@@ -3402,7 +3714,7 @@
             <p:ph idx="1"/>
           </p:nvPr>
         </p:nvPicPr>
-        <p:blipFill rotWithShape="1">
+        <p:blipFill>
           <a:blip r:embed="rId2">
             <a:extLst>
               <a:ext uri="{28A0092B-C50C-407E-A947-70E740481C1C}">
@@ -3410,16 +3722,58 @@
               </a:ext>
             </a:extLst>
           </a:blip>
-          <a:srcRect l="9862" t="13318" r="11555"/>
-          <a:stretch/>
+          <a:stretch>
+            <a:fillRect/>
+          </a:stretch>
         </p:blipFill>
         <p:spPr>
           <a:xfrm>
-            <a:off x="1400174" y="1204109"/>
-            <a:ext cx="9124951" cy="5653891"/>
+            <a:off x="2064775" y="165053"/>
+            <a:ext cx="8347586" cy="6605584"/>
           </a:xfrm>
         </p:spPr>
       </p:pic>
+      <p:sp>
+        <p:nvSpPr>
+          <p:cNvPr id="2" name="Título 1">
+            <a:extLst>
+              <a:ext uri="{FF2B5EF4-FFF2-40B4-BE49-F238E27FC236}">
+                <a16:creationId xmlns:a16="http://schemas.microsoft.com/office/drawing/2014/main" id="{BE6D8F10-9168-4897-A64A-2723EE6250FA}"/>
+              </a:ext>
+            </a:extLst>
+          </p:cNvPr>
+          <p:cNvSpPr>
+            <a:spLocks noGrp="1"/>
+          </p:cNvSpPr>
+          <p:nvPr>
+            <p:ph type="title"/>
+          </p:nvPr>
+        </p:nvSpPr>
+        <p:spPr>
+          <a:xfrm>
+            <a:off x="285136" y="464015"/>
+            <a:ext cx="5412921" cy="660399"/>
+          </a:xfrm>
+        </p:spPr>
+        <p:txBody>
+          <a:bodyPr>
+            <a:normAutofit/>
+          </a:bodyPr>
+          <a:lstStyle/>
+          <a:p>
+            <a:r>
+              <a:rPr lang="pt-BR" sz="3200" dirty="0">
+                <a:solidFill>
+                  <a:srgbClr val="4DB033"/>
+                </a:solidFill>
+                <a:latin typeface="Dubai Medium" panose="020B0603030403030204" pitchFamily="34" charset="-78"/>
+                <a:cs typeface="Dubai Medium" panose="020B0603030403030204" pitchFamily="34" charset="-78"/>
+              </a:rPr>
+              <a:t>Diagrama Lógico BD</a:t>
+            </a:r>
+          </a:p>
+        </p:txBody>
+      </p:sp>
       <p:cxnSp>
         <p:nvCxnSpPr>
           <p:cNvPr id="10" name="Conector reto 9">
@@ -3436,8 +3790,8 @@
         </p:nvCxnSpPr>
         <p:spPr>
           <a:xfrm flipH="1">
-            <a:off x="1" y="981076"/>
-            <a:ext cx="3619499" cy="0"/>
+            <a:off x="2" y="981076"/>
+            <a:ext cx="4129546" cy="0"/>
           </a:xfrm>
           <a:prstGeom prst="line">
             <a:avLst/>
@@ -3472,10 +3826,10 @@
       </p:cxnSp>
       <p:pic>
         <p:nvPicPr>
-          <p:cNvPr id="7" name="Espaço Reservado para Conteúdo 5" descr="Uma imagem contendo desenho&#10;&#10;Descrição gerada automaticamente">
-            <a:extLst>
-              <a:ext uri="{FF2B5EF4-FFF2-40B4-BE49-F238E27FC236}">
-                <a16:creationId xmlns:a16="http://schemas.microsoft.com/office/drawing/2014/main" id="{0ACEF69C-A13B-4E42-B000-34DD5A462017}"/>
+          <p:cNvPr id="6" name="Espaço Reservado para Conteúdo 5" descr="Uma imagem contendo desenho&#10;&#10;Descrição gerada automaticamente">
+            <a:extLst>
+              <a:ext uri="{FF2B5EF4-FFF2-40B4-BE49-F238E27FC236}">
+                <a16:creationId xmlns:a16="http://schemas.microsoft.com/office/drawing/2014/main" id="{47A08B82-963C-4891-9394-22966D814E73}"/>
               </a:ext>
             </a:extLst>
           </p:cNvPr>
@@ -3509,7 +3863,7 @@
     </p:spTree>
     <p:extLst>
       <p:ext uri="{BB962C8B-B14F-4D97-AF65-F5344CB8AC3E}">
-        <p14:creationId xmlns:p14="http://schemas.microsoft.com/office/powerpoint/2010/main" val="3009486538"/>
+        <p14:creationId xmlns:p14="http://schemas.microsoft.com/office/powerpoint/2010/main" val="384798924"/>
       </p:ext>
     </p:extLst>
   </p:cSld>
@@ -3554,8 +3908,8 @@
         </p:nvSpPr>
         <p:spPr>
           <a:xfrm>
-            <a:off x="476602" y="444965"/>
-            <a:ext cx="5412921" cy="660399"/>
+            <a:off x="314779" y="445284"/>
+            <a:ext cx="3848100" cy="758825"/>
           </a:xfrm>
         </p:spPr>
         <p:txBody>
@@ -3572,17 +3926,17 @@
                 <a:latin typeface="Dubai Medium" panose="020B0603030403030204" pitchFamily="34" charset="-78"/>
                 <a:cs typeface="Dubai Medium" panose="020B0603030403030204" pitchFamily="34" charset="-78"/>
               </a:rPr>
-              <a:t>Aplicação Java</a:t>
+              <a:t>Site Institucional</a:t>
             </a:r>
           </a:p>
         </p:txBody>
       </p:sp>
       <p:pic>
         <p:nvPicPr>
-          <p:cNvPr id="8" name="Espaço Reservado para Conteúdo 7">
-            <a:extLst>
-              <a:ext uri="{FF2B5EF4-FFF2-40B4-BE49-F238E27FC236}">
-                <a16:creationId xmlns:a16="http://schemas.microsoft.com/office/drawing/2014/main" id="{1229AD75-F048-4077-A97A-C33B146C46B0}"/>
+          <p:cNvPr id="5" name="Espaço Reservado para Conteúdo 4" descr="Uma imagem contendo screenshot, texto&#10;&#10;Descrição gerada automaticamente">
+            <a:extLst>
+              <a:ext uri="{FF2B5EF4-FFF2-40B4-BE49-F238E27FC236}">
+                <a16:creationId xmlns:a16="http://schemas.microsoft.com/office/drawing/2014/main" id="{A5749119-35E4-4619-8C72-F0FC1080B386}"/>
               </a:ext>
             </a:extLst>
           </p:cNvPr>
@@ -3594,18 +3948,21 @@
           </p:nvPr>
         </p:nvPicPr>
         <p:blipFill rotWithShape="1">
-          <a:blip r:embed="rId2"/>
-          <a:srcRect l="180" t="672" r="361" b="983"/>
+          <a:blip r:embed="rId2">
+            <a:extLst>
+              <a:ext uri="{28A0092B-C50C-407E-A947-70E740481C1C}">
+                <a14:useLocalDpi xmlns:a14="http://schemas.microsoft.com/office/drawing/2010/main" val="0"/>
+              </a:ext>
+            </a:extLst>
+          </a:blip>
+          <a:srcRect l="9862" t="13318" r="11555"/>
           <a:stretch/>
         </p:blipFill>
         <p:spPr>
           <a:xfrm>
-            <a:off x="2724282" y="1379074"/>
-            <a:ext cx="6743435" cy="5033961"/>
-          </a:xfrm>
-          <a:prstGeom prst="rect">
-            <a:avLst/>
-          </a:prstGeom>
+            <a:off x="1400174" y="1204109"/>
+            <a:ext cx="9124951" cy="5653891"/>
+          </a:xfrm>
         </p:spPr>
       </p:pic>
       <p:cxnSp>
@@ -3624,8 +3981,8 @@
         </p:nvCxnSpPr>
         <p:spPr>
           <a:xfrm flipH="1">
-            <a:off x="2" y="981076"/>
-            <a:ext cx="3156153" cy="0"/>
+            <a:off x="1" y="981076"/>
+            <a:ext cx="3619499" cy="0"/>
           </a:xfrm>
           <a:prstGeom prst="line">
             <a:avLst/>
@@ -3660,10 +4017,10 @@
       </p:cxnSp>
       <p:pic>
         <p:nvPicPr>
-          <p:cNvPr id="6" name="Espaço Reservado para Conteúdo 5" descr="Uma imagem contendo desenho&#10;&#10;Descrição gerada automaticamente">
-            <a:extLst>
-              <a:ext uri="{FF2B5EF4-FFF2-40B4-BE49-F238E27FC236}">
-                <a16:creationId xmlns:a16="http://schemas.microsoft.com/office/drawing/2014/main" id="{47A08B82-963C-4891-9394-22966D814E73}"/>
+          <p:cNvPr id="7" name="Espaço Reservado para Conteúdo 5" descr="Uma imagem contendo desenho&#10;&#10;Descrição gerada automaticamente">
+            <a:extLst>
+              <a:ext uri="{FF2B5EF4-FFF2-40B4-BE49-F238E27FC236}">
+                <a16:creationId xmlns:a16="http://schemas.microsoft.com/office/drawing/2014/main" id="{0ACEF69C-A13B-4E42-B000-34DD5A462017}"/>
               </a:ext>
             </a:extLst>
           </p:cNvPr>
@@ -3694,46 +4051,10 @@
           </a:prstGeom>
         </p:spPr>
       </p:pic>
-      <p:pic>
-        <p:nvPicPr>
-          <p:cNvPr id="20" name="Imagem 19" descr="Uma imagem contendo animal, invertebrado, luz, desenho&#10;&#10;Descrição gerada automaticamente">
-            <a:extLst>
-              <a:ext uri="{FF2B5EF4-FFF2-40B4-BE49-F238E27FC236}">
-                <a16:creationId xmlns:a16="http://schemas.microsoft.com/office/drawing/2014/main" id="{B8A26010-3201-4C94-A90B-94D89BEF6E37}"/>
-              </a:ext>
-            </a:extLst>
-          </p:cNvPr>
-          <p:cNvPicPr>
-            <a:picLocks noChangeAspect="1"/>
-          </p:cNvPicPr>
-          <p:nvPr/>
-        </p:nvPicPr>
-        <p:blipFill>
-          <a:blip r:embed="rId4">
-            <a:extLst>
-              <a:ext uri="{28A0092B-C50C-407E-A947-70E740481C1C}">
-                <a14:useLocalDpi xmlns:a14="http://schemas.microsoft.com/office/drawing/2010/main" val="0"/>
-              </a:ext>
-            </a:extLst>
-          </a:blip>
-          <a:stretch>
-            <a:fillRect/>
-          </a:stretch>
-        </p:blipFill>
-        <p:spPr>
-          <a:xfrm>
-            <a:off x="164508" y="4757865"/>
-            <a:ext cx="3481514" cy="1442121"/>
-          </a:xfrm>
-          <a:prstGeom prst="rect">
-            <a:avLst/>
-          </a:prstGeom>
-        </p:spPr>
-      </p:pic>
     </p:spTree>
     <p:extLst>
       <p:ext uri="{BB962C8B-B14F-4D97-AF65-F5344CB8AC3E}">
-        <p14:creationId xmlns:p14="http://schemas.microsoft.com/office/powerpoint/2010/main" val="1105126272"/>
+        <p14:creationId xmlns:p14="http://schemas.microsoft.com/office/powerpoint/2010/main" val="3009486538"/>
       </p:ext>
     </p:extLst>
   </p:cSld>
@@ -3778,8 +4099,8 @@
         </p:nvSpPr>
         <p:spPr>
           <a:xfrm>
-            <a:off x="454478" y="419099"/>
-            <a:ext cx="4498522" cy="790577"/>
+            <a:off x="476602" y="444965"/>
+            <a:ext cx="5412921" cy="660399"/>
           </a:xfrm>
         </p:spPr>
         <p:txBody>
@@ -3796,37 +4117,17 @@
                 <a:latin typeface="Dubai Medium" panose="020B0603030403030204" pitchFamily="34" charset="-78"/>
                 <a:cs typeface="Dubai Medium" panose="020B0603030403030204" pitchFamily="34" charset="-78"/>
               </a:rPr>
-              <a:t>Virtual </a:t>
-            </a:r>
-            <a:r>
-              <a:rPr lang="pt-BR" sz="3200" dirty="0" err="1">
-                <a:solidFill>
-                  <a:srgbClr val="4DB033"/>
-                </a:solidFill>
-                <a:latin typeface="Dubai Medium" panose="020B0603030403030204" pitchFamily="34" charset="-78"/>
-                <a:cs typeface="Dubai Medium" panose="020B0603030403030204" pitchFamily="34" charset="-78"/>
-              </a:rPr>
-              <a:t>Machine</a:t>
-            </a:r>
-            <a:r>
-              <a:rPr lang="pt-BR" sz="3200" dirty="0">
-                <a:solidFill>
-                  <a:srgbClr val="4DB033"/>
-                </a:solidFill>
-                <a:latin typeface="Dubai Medium" panose="020B0603030403030204" pitchFamily="34" charset="-78"/>
-                <a:cs typeface="Dubai Medium" panose="020B0603030403030204" pitchFamily="34" charset="-78"/>
-              </a:rPr>
-              <a:t> - Linux</a:t>
+              <a:t>Aplicação Java</a:t>
             </a:r>
           </a:p>
         </p:txBody>
       </p:sp>
       <p:pic>
         <p:nvPicPr>
-          <p:cNvPr id="7" name="Espaço Reservado para Conteúdo 6" descr="Tela de computador com fundo azul&#10;&#10;Descrição gerada automaticamente">
-            <a:extLst>
-              <a:ext uri="{FF2B5EF4-FFF2-40B4-BE49-F238E27FC236}">
-                <a16:creationId xmlns:a16="http://schemas.microsoft.com/office/drawing/2014/main" id="{DE1D7D90-463E-4A07-BEEA-48DC9239D3D3}"/>
+          <p:cNvPr id="8" name="Espaço Reservado para Conteúdo 7">
+            <a:extLst>
+              <a:ext uri="{FF2B5EF4-FFF2-40B4-BE49-F238E27FC236}">
+                <a16:creationId xmlns:a16="http://schemas.microsoft.com/office/drawing/2014/main" id="{1229AD75-F048-4077-A97A-C33B146C46B0}"/>
               </a:ext>
             </a:extLst>
           </p:cNvPr>
@@ -3837,23 +4138,19 @@
             <p:ph idx="1"/>
           </p:nvPr>
         </p:nvPicPr>
-        <p:blipFill>
-          <a:blip r:embed="rId2">
-            <a:extLst>
-              <a:ext uri="{28A0092B-C50C-407E-A947-70E740481C1C}">
-                <a14:useLocalDpi xmlns:a14="http://schemas.microsoft.com/office/drawing/2010/main" val="0"/>
-              </a:ext>
-            </a:extLst>
-          </a:blip>
-          <a:stretch>
-            <a:fillRect/>
-          </a:stretch>
+        <p:blipFill rotWithShape="1">
+          <a:blip r:embed="rId2"/>
+          <a:srcRect l="180" t="672" r="361" b="983"/>
+          <a:stretch/>
         </p:blipFill>
         <p:spPr>
           <a:xfrm>
-            <a:off x="1588780" y="1209688"/>
-            <a:ext cx="8366740" cy="5229213"/>
-          </a:xfrm>
+            <a:off x="1344693" y="1269185"/>
+            <a:ext cx="6743435" cy="5033961"/>
+          </a:xfrm>
+          <a:prstGeom prst="rect">
+            <a:avLst/>
+          </a:prstGeom>
         </p:spPr>
       </p:pic>
       <p:cxnSp>
@@ -3873,7 +4170,7 @@
         <p:spPr>
           <a:xfrm flipH="1">
             <a:off x="2" y="981076"/>
-            <a:ext cx="4686298" cy="0"/>
+            <a:ext cx="3156153" cy="0"/>
           </a:xfrm>
           <a:prstGeom prst="line">
             <a:avLst/>
@@ -3908,10 +4205,10 @@
       </p:cxnSp>
       <p:pic>
         <p:nvPicPr>
-          <p:cNvPr id="9" name="Imagem 8" descr="Uma imagem contendo mesa, amarelo&#10;&#10;Descrição gerada automaticamente">
-            <a:extLst>
-              <a:ext uri="{FF2B5EF4-FFF2-40B4-BE49-F238E27FC236}">
-                <a16:creationId xmlns:a16="http://schemas.microsoft.com/office/drawing/2014/main" id="{BA1C26B1-4AE2-401B-8DD0-5EE7C03BC070}"/>
+          <p:cNvPr id="6" name="Espaço Reservado para Conteúdo 5" descr="Uma imagem contendo desenho&#10;&#10;Descrição gerada automaticamente">
+            <a:extLst>
+              <a:ext uri="{FF2B5EF4-FFF2-40B4-BE49-F238E27FC236}">
+                <a16:creationId xmlns:a16="http://schemas.microsoft.com/office/drawing/2014/main" id="{47A08B82-963C-4891-9394-22966D814E73}"/>
               </a:ext>
             </a:extLst>
           </p:cNvPr>
@@ -3934,8 +4231,8 @@
         </p:blipFill>
         <p:spPr>
           <a:xfrm>
-            <a:off x="8748558" y="3733800"/>
-            <a:ext cx="2716040" cy="3200400"/>
+            <a:off x="10286734" y="-387713"/>
+            <a:ext cx="1905266" cy="1905266"/>
           </a:xfrm>
           <a:prstGeom prst="rect">
             <a:avLst/>
@@ -3944,10 +4241,10 @@
       </p:pic>
       <p:pic>
         <p:nvPicPr>
-          <p:cNvPr id="11" name="Espaço Reservado para Conteúdo 5" descr="Uma imagem contendo desenho&#10;&#10;Descrição gerada automaticamente">
-            <a:extLst>
-              <a:ext uri="{FF2B5EF4-FFF2-40B4-BE49-F238E27FC236}">
-                <a16:creationId xmlns:a16="http://schemas.microsoft.com/office/drawing/2014/main" id="{FA212766-4571-40CD-B384-D4F3FF0E2A39}"/>
+          <p:cNvPr id="20" name="Imagem 19" descr="Uma imagem contendo animal, invertebrado, luz, desenho&#10;&#10;Descrição gerada automaticamente">
+            <a:extLst>
+              <a:ext uri="{FF2B5EF4-FFF2-40B4-BE49-F238E27FC236}">
+                <a16:creationId xmlns:a16="http://schemas.microsoft.com/office/drawing/2014/main" id="{B8A26010-3201-4C94-A90B-94D89BEF6E37}"/>
               </a:ext>
             </a:extLst>
           </p:cNvPr>
@@ -3970,8 +4267,8 @@
         </p:blipFill>
         <p:spPr>
           <a:xfrm>
-            <a:off x="10286734" y="-387713"/>
-            <a:ext cx="1905266" cy="1905266"/>
+            <a:off x="8135565" y="2347673"/>
+            <a:ext cx="3481514" cy="1442121"/>
           </a:xfrm>
           <a:prstGeom prst="rect">
             <a:avLst/>
@@ -3981,7 +4278,7 @@
     </p:spTree>
     <p:extLst>
       <p:ext uri="{BB962C8B-B14F-4D97-AF65-F5344CB8AC3E}">
-        <p14:creationId xmlns:p14="http://schemas.microsoft.com/office/powerpoint/2010/main" val="514807920"/>
+        <p14:creationId xmlns:p14="http://schemas.microsoft.com/office/powerpoint/2010/main" val="1105126272"/>
       </p:ext>
     </p:extLst>
   </p:cSld>
@@ -4044,7 +4341,27 @@
                 <a:latin typeface="Dubai Medium" panose="020B0603030403030204" pitchFamily="34" charset="-78"/>
                 <a:cs typeface="Dubai Medium" panose="020B0603030403030204" pitchFamily="34" charset="-78"/>
               </a:rPr>
-              <a:t>Futuras Alterações</a:t>
+              <a:t>Virtual </a:t>
+            </a:r>
+            <a:r>
+              <a:rPr lang="pt-BR" sz="3200" dirty="0" err="1">
+                <a:solidFill>
+                  <a:srgbClr val="4DB033"/>
+                </a:solidFill>
+                <a:latin typeface="Dubai Medium" panose="020B0603030403030204" pitchFamily="34" charset="-78"/>
+                <a:cs typeface="Dubai Medium" panose="020B0603030403030204" pitchFamily="34" charset="-78"/>
+              </a:rPr>
+              <a:t>Machine</a:t>
+            </a:r>
+            <a:r>
+              <a:rPr lang="pt-BR" sz="3200" dirty="0">
+                <a:solidFill>
+                  <a:srgbClr val="4DB033"/>
+                </a:solidFill>
+                <a:latin typeface="Dubai Medium" panose="020B0603030403030204" pitchFamily="34" charset="-78"/>
+                <a:cs typeface="Dubai Medium" panose="020B0603030403030204" pitchFamily="34" charset="-78"/>
+              </a:rPr>
+              <a:t> - Linux</a:t>
             </a:r>
           </a:p>
         </p:txBody>
@@ -4209,7 +4526,7 @@
     </p:spTree>
     <p:extLst>
       <p:ext uri="{BB962C8B-B14F-4D97-AF65-F5344CB8AC3E}">
-        <p14:creationId xmlns:p14="http://schemas.microsoft.com/office/powerpoint/2010/main" val="3224431087"/>
+        <p14:creationId xmlns:p14="http://schemas.microsoft.com/office/powerpoint/2010/main" val="514807920"/>
       </p:ext>
     </p:extLst>
   </p:cSld>
@@ -4241,7 +4558,7 @@
           <p:cNvPr id="2" name="Título 1">
             <a:extLst>
               <a:ext uri="{FF2B5EF4-FFF2-40B4-BE49-F238E27FC236}">
-                <a16:creationId xmlns:a16="http://schemas.microsoft.com/office/drawing/2014/main" id="{79A35C3B-42A1-4734-9E74-8A10759170F2}"/>
+                <a16:creationId xmlns:a16="http://schemas.microsoft.com/office/drawing/2014/main" id="{BE6D8F10-9168-4897-A64A-2723EE6250FA}"/>
               </a:ext>
             </a:extLst>
           </p:cNvPr>
@@ -4252,47 +4569,862 @@
             <p:ph type="title"/>
           </p:nvPr>
         </p:nvSpPr>
-        <p:spPr/>
-        <p:txBody>
-          <a:bodyPr/>
+        <p:spPr>
+          <a:xfrm>
+            <a:off x="454478" y="419099"/>
+            <a:ext cx="4498522" cy="790577"/>
+          </a:xfrm>
+        </p:spPr>
+        <p:txBody>
+          <a:bodyPr>
+            <a:normAutofit/>
+          </a:bodyPr>
           <a:lstStyle/>
           <a:p>
             <a:r>
-              <a:rPr lang="pt-BR" dirty="0"/>
-              <a:t>Conclusão</a:t>
-            </a:r>
-            <a:br>
-              <a:rPr lang="pt-BR" dirty="0"/>
-            </a:br>
-            <a:endParaRPr lang="pt-BR" dirty="0"/>
-          </a:p>
-        </p:txBody>
-      </p:sp>
-      <p:sp>
-        <p:nvSpPr>
-          <p:cNvPr id="3" name="Espaço Reservado para Conteúdo 2">
-            <a:extLst>
-              <a:ext uri="{FF2B5EF4-FFF2-40B4-BE49-F238E27FC236}">
-                <a16:creationId xmlns:a16="http://schemas.microsoft.com/office/drawing/2014/main" id="{CB3EA8BA-65F5-4C00-87A0-7DFB7BF3EC15}"/>
-              </a:ext>
-            </a:extLst>
-          </p:cNvPr>
-          <p:cNvSpPr>
-            <a:spLocks noGrp="1"/>
-          </p:cNvSpPr>
+              <a:rPr lang="pt-BR" sz="3200" dirty="0">
+                <a:solidFill>
+                  <a:srgbClr val="4DB033"/>
+                </a:solidFill>
+                <a:latin typeface="Dubai Medium" panose="020B0603030403030204" pitchFamily="34" charset="-78"/>
+                <a:cs typeface="Dubai Medium" panose="020B0603030403030204" pitchFamily="34" charset="-78"/>
+              </a:rPr>
+              <a:t>Futuras Alterações</a:t>
+            </a:r>
+          </a:p>
+        </p:txBody>
+      </p:sp>
+      <p:cxnSp>
+        <p:nvCxnSpPr>
+          <p:cNvPr id="10" name="Conector reto 9">
+            <a:extLst>
+              <a:ext uri="{FF2B5EF4-FFF2-40B4-BE49-F238E27FC236}">
+                <a16:creationId xmlns:a16="http://schemas.microsoft.com/office/drawing/2014/main" id="{B0260FB3-F747-4ADD-A7B2-81FDF008C973}"/>
+              </a:ext>
+            </a:extLst>
+          </p:cNvPr>
+          <p:cNvCxnSpPr>
+            <a:cxnSpLocks/>
+          </p:cNvCxnSpPr>
+          <p:nvPr/>
+        </p:nvCxnSpPr>
+        <p:spPr>
+          <a:xfrm flipH="1">
+            <a:off x="2" y="981076"/>
+            <a:ext cx="4028659" cy="0"/>
+          </a:xfrm>
+          <a:prstGeom prst="line">
+            <a:avLst/>
+          </a:prstGeom>
+          <a:ln>
+            <a:solidFill>
+              <a:srgbClr val="6B1979"/>
+            </a:solidFill>
+          </a:ln>
+          <a:effectLst>
+            <a:glow rad="63500">
+              <a:srgbClr val="6B1979">
+                <a:alpha val="40000"/>
+              </a:srgbClr>
+            </a:glow>
+          </a:effectLst>
+        </p:spPr>
+        <p:style>
+          <a:lnRef idx="1">
+            <a:schemeClr val="accent1"/>
+          </a:lnRef>
+          <a:fillRef idx="0">
+            <a:schemeClr val="accent1"/>
+          </a:fillRef>
+          <a:effectRef idx="0">
+            <a:schemeClr val="accent1"/>
+          </a:effectRef>
+          <a:fontRef idx="minor">
+            <a:schemeClr val="tx1"/>
+          </a:fontRef>
+        </p:style>
+      </p:cxnSp>
+      <p:pic>
+        <p:nvPicPr>
+          <p:cNvPr id="11" name="Espaço Reservado para Conteúdo 5" descr="Uma imagem contendo desenho&#10;&#10;Descrição gerada automaticamente">
+            <a:extLst>
+              <a:ext uri="{FF2B5EF4-FFF2-40B4-BE49-F238E27FC236}">
+                <a16:creationId xmlns:a16="http://schemas.microsoft.com/office/drawing/2014/main" id="{FA212766-4571-40CD-B384-D4F3FF0E2A39}"/>
+              </a:ext>
+            </a:extLst>
+          </p:cNvPr>
+          <p:cNvPicPr>
+            <a:picLocks noChangeAspect="1"/>
+          </p:cNvPicPr>
+          <p:nvPr/>
+        </p:nvPicPr>
+        <p:blipFill>
+          <a:blip r:embed="rId2">
+            <a:extLst>
+              <a:ext uri="{28A0092B-C50C-407E-A947-70E740481C1C}">
+                <a14:useLocalDpi xmlns:a14="http://schemas.microsoft.com/office/drawing/2010/main" val="0"/>
+              </a:ext>
+            </a:extLst>
+          </a:blip>
+          <a:stretch>
+            <a:fillRect/>
+          </a:stretch>
+        </p:blipFill>
+        <p:spPr>
+          <a:xfrm>
+            <a:off x="10286734" y="-387713"/>
+            <a:ext cx="1905266" cy="1905266"/>
+          </a:xfrm>
+          <a:prstGeom prst="rect">
+            <a:avLst/>
+          </a:prstGeom>
+        </p:spPr>
+      </p:pic>
+      <p:sp>
+        <p:nvSpPr>
+          <p:cNvPr id="8" name="Retângulo 7">
+            <a:extLst>
+              <a:ext uri="{FF2B5EF4-FFF2-40B4-BE49-F238E27FC236}">
+                <a16:creationId xmlns:a16="http://schemas.microsoft.com/office/drawing/2014/main" id="{5DB4D93D-4A69-41B1-A7D6-D654CA897F8D}"/>
+              </a:ext>
+            </a:extLst>
+          </p:cNvPr>
+          <p:cNvSpPr/>
+          <p:nvPr/>
+        </p:nvSpPr>
+        <p:spPr>
+          <a:xfrm>
+            <a:off x="829213" y="2596822"/>
+            <a:ext cx="1580946" cy="369332"/>
+          </a:xfrm>
+          <a:prstGeom prst="rect">
+            <a:avLst/>
+          </a:prstGeom>
+        </p:spPr>
+        <p:txBody>
+          <a:bodyPr wrap="none">
+            <a:spAutoFit/>
+          </a:bodyPr>
+          <a:lstStyle/>
+          <a:p>
+            <a:pPr marL="285750" indent="-285750">
+              <a:buFont typeface="Arial" panose="020B0604020202020204" pitchFamily="34" charset="0"/>
+              <a:buChar char="•"/>
+            </a:pPr>
+            <a:r>
+              <a:rPr lang="pt-BR" dirty="0">
+                <a:solidFill>
+                  <a:srgbClr val="6B1979"/>
+                </a:solidFill>
+                <a:latin typeface="Dubai" panose="020B0503030403030204" pitchFamily="34" charset="-78"/>
+                <a:cs typeface="Dubai" panose="020B0503030403030204" pitchFamily="34" charset="-78"/>
+              </a:rPr>
+              <a:t>Dashboards</a:t>
+            </a:r>
+          </a:p>
+        </p:txBody>
+      </p:sp>
+      <p:sp>
+        <p:nvSpPr>
+          <p:cNvPr id="15" name="Retângulo 14">
+            <a:extLst>
+              <a:ext uri="{FF2B5EF4-FFF2-40B4-BE49-F238E27FC236}">
+                <a16:creationId xmlns:a16="http://schemas.microsoft.com/office/drawing/2014/main" id="{D4EA4A55-B622-4DE2-B199-60EAE033491E}"/>
+              </a:ext>
+            </a:extLst>
+          </p:cNvPr>
+          <p:cNvSpPr/>
+          <p:nvPr/>
+        </p:nvSpPr>
+        <p:spPr>
+          <a:xfrm>
+            <a:off x="287707" y="5083024"/>
+            <a:ext cx="3113181" cy="369332"/>
+          </a:xfrm>
+          <a:prstGeom prst="rect">
+            <a:avLst/>
+          </a:prstGeom>
+        </p:spPr>
+        <p:txBody>
+          <a:bodyPr wrap="square">
+            <a:spAutoFit/>
+          </a:bodyPr>
+          <a:lstStyle/>
+          <a:p>
+            <a:pPr marL="742950" lvl="1" indent="-285750">
+              <a:buFont typeface="Arial" panose="020B0604020202020204" pitchFamily="34" charset="0"/>
+              <a:buChar char="•"/>
+            </a:pPr>
+            <a:r>
+              <a:rPr lang="pt-BR" dirty="0">
+                <a:solidFill>
+                  <a:srgbClr val="6B1979"/>
+                </a:solidFill>
+                <a:latin typeface="Dubai" panose="020B0503030403030204" pitchFamily="34" charset="-78"/>
+                <a:cs typeface="Dubai" panose="020B0503030403030204" pitchFamily="34" charset="-78"/>
+              </a:rPr>
+              <a:t>Painel Administrativo</a:t>
+            </a:r>
+          </a:p>
+        </p:txBody>
+      </p:sp>
+      <p:sp>
+        <p:nvSpPr>
+          <p:cNvPr id="16" name="Retângulo 15">
+            <a:extLst>
+              <a:ext uri="{FF2B5EF4-FFF2-40B4-BE49-F238E27FC236}">
+                <a16:creationId xmlns:a16="http://schemas.microsoft.com/office/drawing/2014/main" id="{C1A3D75C-4DE4-4192-AB88-A23E20810821}"/>
+              </a:ext>
+            </a:extLst>
+          </p:cNvPr>
+          <p:cNvSpPr/>
+          <p:nvPr/>
+        </p:nvSpPr>
+        <p:spPr>
+          <a:xfrm>
+            <a:off x="287707" y="4678130"/>
+            <a:ext cx="5141985" cy="369332"/>
+          </a:xfrm>
+          <a:prstGeom prst="rect">
+            <a:avLst/>
+          </a:prstGeom>
+        </p:spPr>
+        <p:txBody>
+          <a:bodyPr wrap="none">
+            <a:spAutoFit/>
+          </a:bodyPr>
+          <a:lstStyle/>
+          <a:p>
+            <a:pPr marL="742950" lvl="1" indent="-285750">
+              <a:buFont typeface="Arial" panose="020B0604020202020204" pitchFamily="34" charset="0"/>
+              <a:buChar char="•"/>
+            </a:pPr>
+            <a:r>
+              <a:rPr lang="pt-BR" dirty="0">
+                <a:solidFill>
+                  <a:srgbClr val="6B1979"/>
+                </a:solidFill>
+                <a:latin typeface="Dubai" panose="020B0503030403030204" pitchFamily="34" charset="-78"/>
+                <a:cs typeface="Dubai" panose="020B0503030403030204" pitchFamily="34" charset="-78"/>
+              </a:rPr>
+              <a:t>Envio de mensagens pelo aplicativo </a:t>
+            </a:r>
+            <a:r>
+              <a:rPr lang="pt-BR" dirty="0" err="1">
+                <a:solidFill>
+                  <a:srgbClr val="6B1979"/>
+                </a:solidFill>
+                <a:latin typeface="Dubai" panose="020B0503030403030204" pitchFamily="34" charset="-78"/>
+                <a:cs typeface="Dubai" panose="020B0503030403030204" pitchFamily="34" charset="-78"/>
+              </a:rPr>
+              <a:t>Telegram</a:t>
+            </a:r>
+            <a:endParaRPr lang="pt-BR" dirty="0">
+              <a:solidFill>
+                <a:srgbClr val="6B1979"/>
+              </a:solidFill>
+              <a:latin typeface="Dubai" panose="020B0503030403030204" pitchFamily="34" charset="-78"/>
+              <a:cs typeface="Dubai" panose="020B0503030403030204" pitchFamily="34" charset="-78"/>
+            </a:endParaRPr>
+          </a:p>
+        </p:txBody>
+      </p:sp>
+      <p:sp>
+        <p:nvSpPr>
+          <p:cNvPr id="17" name="Retângulo 16">
+            <a:extLst>
+              <a:ext uri="{FF2B5EF4-FFF2-40B4-BE49-F238E27FC236}">
+                <a16:creationId xmlns:a16="http://schemas.microsoft.com/office/drawing/2014/main" id="{2B3C9D55-9224-4FED-9CA9-960EC4C887B1}"/>
+              </a:ext>
+            </a:extLst>
+          </p:cNvPr>
+          <p:cNvSpPr/>
+          <p:nvPr/>
+        </p:nvSpPr>
+        <p:spPr>
+          <a:xfrm>
+            <a:off x="470414" y="1895927"/>
+            <a:ext cx="3087833" cy="646331"/>
+          </a:xfrm>
+          <a:prstGeom prst="rect">
+            <a:avLst/>
+          </a:prstGeom>
+        </p:spPr>
+        <p:txBody>
+          <a:bodyPr wrap="none">
+            <a:spAutoFit/>
+          </a:bodyPr>
+          <a:lstStyle/>
+          <a:p>
+            <a:r>
+              <a:rPr lang="pt-BR" dirty="0">
+                <a:solidFill>
+                  <a:srgbClr val="B02F75"/>
+                </a:solidFill>
+                <a:latin typeface="Dubai" panose="020B0503030403030204" pitchFamily="34" charset="-78"/>
+                <a:cs typeface="Dubai" panose="020B0503030403030204" pitchFamily="34" charset="-78"/>
+              </a:rPr>
+              <a:t>Alterações da identidade visual</a:t>
+            </a:r>
+          </a:p>
+          <a:p>
+            <a:endParaRPr lang="pt-BR" dirty="0">
+              <a:solidFill>
+                <a:srgbClr val="B02F75"/>
+              </a:solidFill>
+              <a:latin typeface="Dubai" panose="020B0503030403030204" pitchFamily="34" charset="-78"/>
+              <a:cs typeface="Dubai" panose="020B0503030403030204" pitchFamily="34" charset="-78"/>
+            </a:endParaRPr>
+          </a:p>
+        </p:txBody>
+      </p:sp>
+      <p:cxnSp>
+        <p:nvCxnSpPr>
+          <p:cNvPr id="18" name="Conector reto 17">
+            <a:extLst>
+              <a:ext uri="{FF2B5EF4-FFF2-40B4-BE49-F238E27FC236}">
+                <a16:creationId xmlns:a16="http://schemas.microsoft.com/office/drawing/2014/main" id="{4B040B4A-0CE1-47E4-B213-ACBA299B796C}"/>
+              </a:ext>
+            </a:extLst>
+          </p:cNvPr>
+          <p:cNvCxnSpPr>
+            <a:cxnSpLocks/>
+          </p:cNvCxnSpPr>
+          <p:nvPr/>
+        </p:nvCxnSpPr>
+        <p:spPr>
+          <a:xfrm flipH="1">
+            <a:off x="0" y="2262937"/>
+            <a:ext cx="3542310" cy="2888"/>
+          </a:xfrm>
+          <a:prstGeom prst="line">
+            <a:avLst/>
+          </a:prstGeom>
+          <a:ln>
+            <a:solidFill>
+              <a:srgbClr val="4DB033"/>
+            </a:solidFill>
+          </a:ln>
+          <a:effectLst>
+            <a:glow rad="63500">
+              <a:srgbClr val="4DB033">
+                <a:alpha val="40000"/>
+              </a:srgbClr>
+            </a:glow>
+          </a:effectLst>
+        </p:spPr>
+        <p:style>
+          <a:lnRef idx="1">
+            <a:schemeClr val="accent1"/>
+          </a:lnRef>
+          <a:fillRef idx="0">
+            <a:schemeClr val="accent1"/>
+          </a:fillRef>
+          <a:effectRef idx="0">
+            <a:schemeClr val="accent1"/>
+          </a:effectRef>
+          <a:fontRef idx="minor">
+            <a:schemeClr val="tx1"/>
+          </a:fontRef>
+        </p:style>
+      </p:cxnSp>
+      <p:sp>
+        <p:nvSpPr>
+          <p:cNvPr id="20" name="Retângulo 19">
+            <a:extLst>
+              <a:ext uri="{FF2B5EF4-FFF2-40B4-BE49-F238E27FC236}">
+                <a16:creationId xmlns:a16="http://schemas.microsoft.com/office/drawing/2014/main" id="{7EAF3FA0-EB09-4D4F-89BB-8C4E82D70490}"/>
+              </a:ext>
+            </a:extLst>
+          </p:cNvPr>
+          <p:cNvSpPr/>
+          <p:nvPr/>
+        </p:nvSpPr>
+        <p:spPr>
+          <a:xfrm>
+            <a:off x="454478" y="4080687"/>
+            <a:ext cx="2279727" cy="369332"/>
+          </a:xfrm>
+          <a:prstGeom prst="rect">
+            <a:avLst/>
+          </a:prstGeom>
+        </p:spPr>
+        <p:txBody>
+          <a:bodyPr wrap="none">
+            <a:spAutoFit/>
+          </a:bodyPr>
+          <a:lstStyle/>
+          <a:p>
+            <a:r>
+              <a:rPr lang="pt-BR" dirty="0">
+                <a:solidFill>
+                  <a:srgbClr val="B02F75"/>
+                </a:solidFill>
+                <a:latin typeface="Dubai" panose="020B0503030403030204" pitchFamily="34" charset="-78"/>
+                <a:cs typeface="Dubai" panose="020B0503030403030204" pitchFamily="34" charset="-78"/>
+              </a:rPr>
+              <a:t>Novas funcionalidades</a:t>
+            </a:r>
+          </a:p>
+        </p:txBody>
+      </p:sp>
+      <p:cxnSp>
+        <p:nvCxnSpPr>
+          <p:cNvPr id="21" name="Conector reto 20">
+            <a:extLst>
+              <a:ext uri="{FF2B5EF4-FFF2-40B4-BE49-F238E27FC236}">
+                <a16:creationId xmlns:a16="http://schemas.microsoft.com/office/drawing/2014/main" id="{A62251EC-D6A2-4002-9B94-C0DED7D19AF2}"/>
+              </a:ext>
+            </a:extLst>
+          </p:cNvPr>
+          <p:cNvCxnSpPr>
+            <a:cxnSpLocks/>
+          </p:cNvCxnSpPr>
+          <p:nvPr/>
+        </p:nvCxnSpPr>
+        <p:spPr>
+          <a:xfrm flipH="1">
+            <a:off x="3" y="4406741"/>
+            <a:ext cx="2734202" cy="0"/>
+          </a:xfrm>
+          <a:prstGeom prst="line">
+            <a:avLst/>
+          </a:prstGeom>
+          <a:ln>
+            <a:solidFill>
+              <a:srgbClr val="4DB033"/>
+            </a:solidFill>
+          </a:ln>
+          <a:effectLst>
+            <a:glow rad="63500">
+              <a:srgbClr val="4DB033">
+                <a:alpha val="40000"/>
+              </a:srgbClr>
+            </a:glow>
+          </a:effectLst>
+        </p:spPr>
+        <p:style>
+          <a:lnRef idx="1">
+            <a:schemeClr val="accent1"/>
+          </a:lnRef>
+          <a:fillRef idx="0">
+            <a:schemeClr val="accent1"/>
+          </a:fillRef>
+          <a:effectRef idx="0">
+            <a:schemeClr val="accent1"/>
+          </a:effectRef>
+          <a:fontRef idx="minor">
+            <a:schemeClr val="tx1"/>
+          </a:fontRef>
+        </p:style>
+      </p:cxnSp>
+      <p:sp>
+        <p:nvSpPr>
+          <p:cNvPr id="23" name="Retângulo 22">
+            <a:extLst>
+              <a:ext uri="{FF2B5EF4-FFF2-40B4-BE49-F238E27FC236}">
+                <a16:creationId xmlns:a16="http://schemas.microsoft.com/office/drawing/2014/main" id="{D076057E-613E-489C-8C45-2BA7477EDEAF}"/>
+              </a:ext>
+            </a:extLst>
+          </p:cNvPr>
+          <p:cNvSpPr/>
+          <p:nvPr/>
+        </p:nvSpPr>
+        <p:spPr>
+          <a:xfrm>
+            <a:off x="287707" y="5487918"/>
+            <a:ext cx="3113181" cy="369332"/>
+          </a:xfrm>
+          <a:prstGeom prst="rect">
+            <a:avLst/>
+          </a:prstGeom>
+        </p:spPr>
+        <p:txBody>
+          <a:bodyPr wrap="square">
+            <a:spAutoFit/>
+          </a:bodyPr>
+          <a:lstStyle/>
+          <a:p>
+            <a:pPr marL="742950" lvl="1" indent="-285750">
+              <a:buFont typeface="Arial" panose="020B0604020202020204" pitchFamily="34" charset="0"/>
+              <a:buChar char="•"/>
+            </a:pPr>
+            <a:r>
+              <a:rPr lang="pt-BR" dirty="0">
+                <a:solidFill>
+                  <a:srgbClr val="6B1979"/>
+                </a:solidFill>
+                <a:latin typeface="Dubai" panose="020B0503030403030204" pitchFamily="34" charset="-78"/>
+                <a:cs typeface="Dubai" panose="020B0503030403030204" pitchFamily="34" charset="-78"/>
+              </a:rPr>
+              <a:t>Tela de RPA</a:t>
+            </a:r>
+          </a:p>
+        </p:txBody>
+      </p:sp>
+      <p:sp>
+        <p:nvSpPr>
+          <p:cNvPr id="24" name="Retângulo 23">
+            <a:extLst>
+              <a:ext uri="{FF2B5EF4-FFF2-40B4-BE49-F238E27FC236}">
+                <a16:creationId xmlns:a16="http://schemas.microsoft.com/office/drawing/2014/main" id="{0D577B34-497E-4132-A987-557F6D6F691A}"/>
+              </a:ext>
+            </a:extLst>
+          </p:cNvPr>
+          <p:cNvSpPr/>
+          <p:nvPr/>
+        </p:nvSpPr>
+        <p:spPr>
+          <a:xfrm>
+            <a:off x="829213" y="3020718"/>
+            <a:ext cx="2653868" cy="369332"/>
+          </a:xfrm>
+          <a:prstGeom prst="rect">
+            <a:avLst/>
+          </a:prstGeom>
+        </p:spPr>
+        <p:txBody>
+          <a:bodyPr wrap="none">
+            <a:spAutoFit/>
+          </a:bodyPr>
+          <a:lstStyle/>
+          <a:p>
+            <a:pPr marL="285750" indent="-285750">
+              <a:buFont typeface="Arial" panose="020B0604020202020204" pitchFamily="34" charset="0"/>
+              <a:buChar char="•"/>
+            </a:pPr>
+            <a:r>
+              <a:rPr lang="pt-BR" dirty="0">
+                <a:solidFill>
+                  <a:srgbClr val="6B1979"/>
+                </a:solidFill>
+                <a:latin typeface="Dubai" panose="020B0503030403030204" pitchFamily="34" charset="-78"/>
+                <a:cs typeface="Dubai" panose="020B0503030403030204" pitchFamily="34" charset="-78"/>
+              </a:rPr>
+              <a:t>Tela de Login/Cadastro</a:t>
+            </a:r>
+          </a:p>
+        </p:txBody>
+      </p:sp>
+      <p:pic>
+        <p:nvPicPr>
+          <p:cNvPr id="26" name="Imagem 25" descr="Uma imagem contendo edifício, janela, relógio&#10;&#10;Descrição gerada automaticamente">
+            <a:extLst>
+              <a:ext uri="{FF2B5EF4-FFF2-40B4-BE49-F238E27FC236}">
+                <a16:creationId xmlns:a16="http://schemas.microsoft.com/office/drawing/2014/main" id="{A7360A93-8D46-4512-95E8-B4735492096E}"/>
+              </a:ext>
+            </a:extLst>
+          </p:cNvPr>
+          <p:cNvPicPr>
+            <a:picLocks noChangeAspect="1"/>
+          </p:cNvPicPr>
+          <p:nvPr/>
+        </p:nvPicPr>
+        <p:blipFill>
+          <a:blip r:embed="rId3">
+            <a:extLst>
+              <a:ext uri="{28A0092B-C50C-407E-A947-70E740481C1C}">
+                <a14:useLocalDpi xmlns:a14="http://schemas.microsoft.com/office/drawing/2010/main" val="0"/>
+              </a:ext>
+            </a:extLst>
+          </a:blip>
+          <a:stretch>
+            <a:fillRect/>
+          </a:stretch>
+        </p:blipFill>
+        <p:spPr>
+          <a:xfrm>
+            <a:off x="5659191" y="2455789"/>
+            <a:ext cx="2320097" cy="1946422"/>
+          </a:xfrm>
+          <a:prstGeom prst="rect">
+            <a:avLst/>
+          </a:prstGeom>
+        </p:spPr>
+      </p:pic>
+      <p:pic>
+        <p:nvPicPr>
+          <p:cNvPr id="30" name="Imagem 29">
+            <a:extLst>
+              <a:ext uri="{FF2B5EF4-FFF2-40B4-BE49-F238E27FC236}">
+                <a16:creationId xmlns:a16="http://schemas.microsoft.com/office/drawing/2014/main" id="{E51110AC-9C39-4144-AA71-E7B1FE0B3551}"/>
+              </a:ext>
+            </a:extLst>
+          </p:cNvPr>
+          <p:cNvPicPr>
+            <a:picLocks noChangeAspect="1"/>
+          </p:cNvPicPr>
+          <p:nvPr/>
+        </p:nvPicPr>
+        <p:blipFill>
+          <a:blip r:embed="rId4">
+            <a:extLst>
+              <a:ext uri="{28A0092B-C50C-407E-A947-70E740481C1C}">
+                <a14:useLocalDpi xmlns:a14="http://schemas.microsoft.com/office/drawing/2010/main" val="0"/>
+              </a:ext>
+            </a:extLst>
+          </a:blip>
+          <a:stretch>
+            <a:fillRect/>
+          </a:stretch>
+        </p:blipFill>
+        <p:spPr>
+          <a:xfrm>
+            <a:off x="8645971" y="4031277"/>
+            <a:ext cx="2279727" cy="2279727"/>
+          </a:xfrm>
+          <a:prstGeom prst="rect">
+            <a:avLst/>
+          </a:prstGeom>
+        </p:spPr>
+      </p:pic>
+      <p:pic>
+        <p:nvPicPr>
+          <p:cNvPr id="35" name="Imagem 34" descr="Uma imagem contendo objeto, desenho, luz&#10;&#10;Descrição gerada automaticamente">
+            <a:extLst>
+              <a:ext uri="{FF2B5EF4-FFF2-40B4-BE49-F238E27FC236}">
+                <a16:creationId xmlns:a16="http://schemas.microsoft.com/office/drawing/2014/main" id="{0ED544B9-C253-41EB-A15B-93B3D66D7017}"/>
+              </a:ext>
+            </a:extLst>
+          </p:cNvPr>
+          <p:cNvPicPr>
+            <a:picLocks noChangeAspect="1"/>
+          </p:cNvPicPr>
+          <p:nvPr/>
+        </p:nvPicPr>
+        <p:blipFill>
+          <a:blip r:embed="rId5">
+            <a:extLst>
+              <a:ext uri="{28A0092B-C50C-407E-A947-70E740481C1C}">
+                <a14:useLocalDpi xmlns:a14="http://schemas.microsoft.com/office/drawing/2010/main" val="0"/>
+              </a:ext>
+            </a:extLst>
+          </a:blip>
+          <a:stretch>
+            <a:fillRect/>
+          </a:stretch>
+        </p:blipFill>
+        <p:spPr>
+          <a:xfrm>
+            <a:off x="8243575" y="1299840"/>
+            <a:ext cx="1954902" cy="1954902"/>
+          </a:xfrm>
+          <a:prstGeom prst="rect">
+            <a:avLst/>
+          </a:prstGeom>
+        </p:spPr>
+      </p:pic>
+    </p:spTree>
+    <p:extLst>
+      <p:ext uri="{BB962C8B-B14F-4D97-AF65-F5344CB8AC3E}">
+        <p14:creationId xmlns:p14="http://schemas.microsoft.com/office/powerpoint/2010/main" val="3224431087"/>
+      </p:ext>
+    </p:extLst>
+  </p:cSld>
+  <p:clrMapOvr>
+    <a:masterClrMapping/>
+  </p:clrMapOvr>
+</p:sld>
+</file>
+
+<file path=ppt/slides/slide15.xml><?xml version="1.0" encoding="utf-8"?>
+<p:sld xmlns:a="http://schemas.openxmlformats.org/drawingml/2006/main" xmlns:r="http://schemas.openxmlformats.org/officeDocument/2006/relationships" xmlns:p="http://schemas.openxmlformats.org/presentationml/2006/main">
+  <p:cSld>
+    <p:spTree>
+      <p:nvGrpSpPr>
+        <p:cNvPr id="1" name=""/>
+        <p:cNvGrpSpPr/>
+        <p:nvPr/>
+      </p:nvGrpSpPr>
+      <p:grpSpPr>
+        <a:xfrm>
+          <a:off x="0" y="0"/>
+          <a:ext cx="0" cy="0"/>
+          <a:chOff x="0" y="0"/>
+          <a:chExt cx="0" cy="0"/>
+        </a:xfrm>
+      </p:grpSpPr>
+      <p:pic>
+        <p:nvPicPr>
+          <p:cNvPr id="10" name="Espaço Reservado para Conteúdo 9" descr="Uma imagem contendo desenho, placar&#10;&#10;Descrição gerada automaticamente">
+            <a:extLst>
+              <a:ext uri="{FF2B5EF4-FFF2-40B4-BE49-F238E27FC236}">
+                <a16:creationId xmlns:a16="http://schemas.microsoft.com/office/drawing/2014/main" id="{5B67EE7D-12EC-4722-8642-F1940C889923}"/>
+              </a:ext>
+            </a:extLst>
+          </p:cNvPr>
+          <p:cNvPicPr>
+            <a:picLocks noGrp="1" noChangeAspect="1"/>
+          </p:cNvPicPr>
           <p:nvPr>
             <p:ph idx="1"/>
           </p:nvPr>
-        </p:nvSpPr>
-        <p:spPr/>
-        <p:txBody>
-          <a:bodyPr/>
-          <a:lstStyle/>
-          <a:p>
-            <a:endParaRPr lang="pt-BR" dirty="0"/>
-          </a:p>
-        </p:txBody>
-      </p:sp>
+        </p:nvPicPr>
+        <p:blipFill>
+          <a:blip r:embed="rId2">
+            <a:extLst>
+              <a:ext uri="{28A0092B-C50C-407E-A947-70E740481C1C}">
+                <a14:useLocalDpi xmlns:a14="http://schemas.microsoft.com/office/drawing/2010/main" val="0"/>
+              </a:ext>
+            </a:extLst>
+          </a:blip>
+          <a:stretch>
+            <a:fillRect/>
+          </a:stretch>
+        </p:blipFill>
+        <p:spPr>
+          <a:xfrm>
+            <a:off x="1073003" y="1219615"/>
+            <a:ext cx="9412513" cy="4941570"/>
+          </a:xfrm>
+        </p:spPr>
+      </p:pic>
+      <p:sp>
+        <p:nvSpPr>
+          <p:cNvPr id="4" name="Título 1">
+            <a:extLst>
+              <a:ext uri="{FF2B5EF4-FFF2-40B4-BE49-F238E27FC236}">
+                <a16:creationId xmlns:a16="http://schemas.microsoft.com/office/drawing/2014/main" id="{8A3DDD9E-D767-4715-9081-18F00E5E9DEF}"/>
+              </a:ext>
+            </a:extLst>
+          </p:cNvPr>
+          <p:cNvSpPr txBox="1">
+            <a:spLocks/>
+          </p:cNvSpPr>
+          <p:nvPr/>
+        </p:nvSpPr>
+        <p:spPr>
+          <a:xfrm>
+            <a:off x="454478" y="419099"/>
+            <a:ext cx="4498522" cy="790577"/>
+          </a:xfrm>
+          <a:prstGeom prst="rect">
+            <a:avLst/>
+          </a:prstGeom>
+        </p:spPr>
+        <p:txBody>
+          <a:bodyPr vert="horz" lIns="91440" tIns="45720" rIns="91440" bIns="45720" rtlCol="0" anchor="ctr">
+            <a:normAutofit/>
+          </a:bodyPr>
+          <a:lstStyle>
+            <a:lvl1pPr algn="l" defTabSz="914400" rtl="0" eaLnBrk="1" latinLnBrk="0" hangingPunct="1">
+              <a:lnSpc>
+                <a:spcPct val="90000"/>
+              </a:lnSpc>
+              <a:spcBef>
+                <a:spcPct val="0"/>
+              </a:spcBef>
+              <a:buNone/>
+              <a:defRPr sz="4400" kern="1200">
+                <a:solidFill>
+                  <a:schemeClr val="tx1"/>
+                </a:solidFill>
+                <a:latin typeface="+mj-lt"/>
+                <a:ea typeface="+mj-ea"/>
+                <a:cs typeface="+mj-cs"/>
+              </a:defRPr>
+            </a:lvl1pPr>
+          </a:lstStyle>
+          <a:p>
+            <a:r>
+              <a:rPr lang="pt-BR" sz="3200" dirty="0">
+                <a:solidFill>
+                  <a:srgbClr val="4DB033"/>
+                </a:solidFill>
+                <a:latin typeface="Dubai Medium" panose="020B0603030403030204" pitchFamily="34" charset="-78"/>
+                <a:cs typeface="Dubai Medium" panose="020B0603030403030204" pitchFamily="34" charset="-78"/>
+              </a:rPr>
+              <a:t>Conclusão</a:t>
+            </a:r>
+          </a:p>
+        </p:txBody>
+      </p:sp>
+      <p:cxnSp>
+        <p:nvCxnSpPr>
+          <p:cNvPr id="5" name="Conector reto 4">
+            <a:extLst>
+              <a:ext uri="{FF2B5EF4-FFF2-40B4-BE49-F238E27FC236}">
+                <a16:creationId xmlns:a16="http://schemas.microsoft.com/office/drawing/2014/main" id="{5D134784-0526-488A-A65B-53E07D6BD493}"/>
+              </a:ext>
+            </a:extLst>
+          </p:cNvPr>
+          <p:cNvCxnSpPr>
+            <a:cxnSpLocks/>
+          </p:cNvCxnSpPr>
+          <p:nvPr/>
+        </p:nvCxnSpPr>
+        <p:spPr>
+          <a:xfrm flipH="1">
+            <a:off x="3" y="981076"/>
+            <a:ext cx="2598054" cy="0"/>
+          </a:xfrm>
+          <a:prstGeom prst="line">
+            <a:avLst/>
+          </a:prstGeom>
+          <a:ln>
+            <a:solidFill>
+              <a:srgbClr val="6B1979"/>
+            </a:solidFill>
+          </a:ln>
+          <a:effectLst>
+            <a:glow rad="63500">
+              <a:srgbClr val="6B1979">
+                <a:alpha val="40000"/>
+              </a:srgbClr>
+            </a:glow>
+          </a:effectLst>
+        </p:spPr>
+        <p:style>
+          <a:lnRef idx="1">
+            <a:schemeClr val="accent1"/>
+          </a:lnRef>
+          <a:fillRef idx="0">
+            <a:schemeClr val="accent1"/>
+          </a:fillRef>
+          <a:effectRef idx="0">
+            <a:schemeClr val="accent1"/>
+          </a:effectRef>
+          <a:fontRef idx="minor">
+            <a:schemeClr val="tx1"/>
+          </a:fontRef>
+        </p:style>
+      </p:cxnSp>
+      <p:pic>
+        <p:nvPicPr>
+          <p:cNvPr id="7" name="Espaço Reservado para Conteúdo 5" descr="Uma imagem contendo desenho&#10;&#10;Descrição gerada automaticamente">
+            <a:extLst>
+              <a:ext uri="{FF2B5EF4-FFF2-40B4-BE49-F238E27FC236}">
+                <a16:creationId xmlns:a16="http://schemas.microsoft.com/office/drawing/2014/main" id="{86B231F3-A698-402E-8852-6BFE2251DA0F}"/>
+              </a:ext>
+            </a:extLst>
+          </p:cNvPr>
+          <p:cNvPicPr>
+            <a:picLocks noChangeAspect="1"/>
+          </p:cNvPicPr>
+          <p:nvPr/>
+        </p:nvPicPr>
+        <p:blipFill>
+          <a:blip r:embed="rId3">
+            <a:extLst>
+              <a:ext uri="{28A0092B-C50C-407E-A947-70E740481C1C}">
+                <a14:useLocalDpi xmlns:a14="http://schemas.microsoft.com/office/drawing/2010/main" val="0"/>
+              </a:ext>
+            </a:extLst>
+          </a:blip>
+          <a:stretch>
+            <a:fillRect/>
+          </a:stretch>
+        </p:blipFill>
+        <p:spPr>
+          <a:xfrm>
+            <a:off x="10286734" y="-387713"/>
+            <a:ext cx="1905266" cy="1905266"/>
+          </a:xfrm>
+          <a:prstGeom prst="rect">
+            <a:avLst/>
+          </a:prstGeom>
+        </p:spPr>
+      </p:pic>
     </p:spTree>
     <p:extLst>
       <p:ext uri="{BB962C8B-B14F-4D97-AF65-F5344CB8AC3E}">
@@ -4306,7 +5438,7 @@
 </p:sld>
 </file>
 
-<file path=ppt/slides/slide15.xml><?xml version="1.0" encoding="utf-8"?>
+<file path=ppt/slides/slide16.xml><?xml version="1.0" encoding="utf-8"?>
 <p:sld xmlns:a="http://schemas.openxmlformats.org/drawingml/2006/main" xmlns:r="http://schemas.openxmlformats.org/officeDocument/2006/relationships" xmlns:p="http://schemas.openxmlformats.org/presentationml/2006/main">
   <p:cSld>
     <p:spTree>
@@ -8603,7 +9735,7 @@
         </p:blipFill>
         <p:spPr>
           <a:xfrm>
-            <a:off x="6588781" y="3229497"/>
+            <a:off x="5559306" y="3318455"/>
             <a:ext cx="1522683" cy="1522683"/>
           </a:xfrm>
           <a:prstGeom prst="rect">
@@ -8639,7 +9771,7 @@
         </p:blipFill>
         <p:spPr>
           <a:xfrm>
-            <a:off x="8913252" y="3385376"/>
+            <a:off x="8303621" y="3318455"/>
             <a:ext cx="1396971" cy="1396971"/>
           </a:xfrm>
           <a:prstGeom prst="rect">
@@ -8675,7 +9807,7 @@
         </p:blipFill>
         <p:spPr>
           <a:xfrm>
-            <a:off x="7646536" y="1289473"/>
+            <a:off x="7036905" y="1290865"/>
             <a:ext cx="1266716" cy="1298517"/>
           </a:xfrm>
           <a:prstGeom prst="rect">
@@ -9136,7 +10268,7 @@
         </p:nvSpPr>
         <p:spPr>
           <a:xfrm>
-            <a:off x="454479" y="450851"/>
+            <a:off x="333828" y="360137"/>
             <a:ext cx="3848100" cy="758825"/>
           </a:xfrm>
         </p:spPr>
@@ -9220,7 +10352,7 @@
         </p:nvCxnSpPr>
         <p:spPr>
           <a:xfrm flipH="1">
-            <a:off x="1" y="981076"/>
+            <a:off x="0" y="908504"/>
             <a:ext cx="3600449" cy="0"/>
           </a:xfrm>
           <a:prstGeom prst="line">
@@ -9234,6 +10366,320 @@
           <a:effectLst>
             <a:glow rad="63500">
               <a:srgbClr val="6B1979">
+                <a:alpha val="40000"/>
+              </a:srgbClr>
+            </a:glow>
+          </a:effectLst>
+        </p:spPr>
+        <p:style>
+          <a:lnRef idx="1">
+            <a:schemeClr val="accent1"/>
+          </a:lnRef>
+          <a:fillRef idx="0">
+            <a:schemeClr val="accent1"/>
+          </a:fillRef>
+          <a:effectRef idx="0">
+            <a:schemeClr val="accent1"/>
+          </a:effectRef>
+          <a:fontRef idx="minor">
+            <a:schemeClr val="tx1"/>
+          </a:fontRef>
+        </p:style>
+      </p:cxnSp>
+      <p:pic>
+        <p:nvPicPr>
+          <p:cNvPr id="5" name="Imagem 4" descr="Uma imagem contendo screenshot, texto&#10;&#10;Descrição gerada automaticamente">
+            <a:extLst>
+              <a:ext uri="{FF2B5EF4-FFF2-40B4-BE49-F238E27FC236}">
+                <a16:creationId xmlns:a16="http://schemas.microsoft.com/office/drawing/2014/main" id="{042519A4-7A02-43FE-B1C5-890A7ACA0DA0}"/>
+              </a:ext>
+            </a:extLst>
+          </p:cNvPr>
+          <p:cNvPicPr>
+            <a:picLocks noChangeAspect="1"/>
+          </p:cNvPicPr>
+          <p:nvPr/>
+        </p:nvPicPr>
+        <p:blipFill rotWithShape="1">
+          <a:blip r:embed="rId3">
+            <a:extLst>
+              <a:ext uri="{28A0092B-C50C-407E-A947-70E740481C1C}">
+                <a14:useLocalDpi xmlns:a14="http://schemas.microsoft.com/office/drawing/2010/main" val="0"/>
+              </a:ext>
+            </a:extLst>
+          </a:blip>
+          <a:srcRect l="6010" r="7128"/>
+          <a:stretch/>
+        </p:blipFill>
+        <p:spPr>
+          <a:xfrm>
+            <a:off x="652371" y="2166250"/>
+            <a:ext cx="4456658" cy="4534812"/>
+          </a:xfrm>
+          <a:prstGeom prst="rect">
+            <a:avLst/>
+          </a:prstGeom>
+        </p:spPr>
+      </p:pic>
+      <p:pic>
+        <p:nvPicPr>
+          <p:cNvPr id="18" name="Imagem 17" descr="Tela de celular com publicação numa rede social&#10;&#10;Descrição gerada automaticamente">
+            <a:extLst>
+              <a:ext uri="{FF2B5EF4-FFF2-40B4-BE49-F238E27FC236}">
+                <a16:creationId xmlns:a16="http://schemas.microsoft.com/office/drawing/2014/main" id="{30DE2708-77EF-440C-AB64-B348F0CDE434}"/>
+              </a:ext>
+            </a:extLst>
+          </p:cNvPr>
+          <p:cNvPicPr>
+            <a:picLocks noChangeAspect="1"/>
+          </p:cNvPicPr>
+          <p:nvPr/>
+        </p:nvPicPr>
+        <p:blipFill rotWithShape="1">
+          <a:blip r:embed="rId4">
+            <a:extLst>
+              <a:ext uri="{28A0092B-C50C-407E-A947-70E740481C1C}">
+                <a14:useLocalDpi xmlns:a14="http://schemas.microsoft.com/office/drawing/2010/main" val="0"/>
+              </a:ext>
+            </a:extLst>
+          </a:blip>
+          <a:srcRect l="7457" r="7218"/>
+          <a:stretch/>
+        </p:blipFill>
+        <p:spPr>
+          <a:xfrm>
+            <a:off x="6149569" y="2166250"/>
+            <a:ext cx="4347641" cy="4565727"/>
+          </a:xfrm>
+          <a:prstGeom prst="rect">
+            <a:avLst/>
+          </a:prstGeom>
+        </p:spPr>
+      </p:pic>
+      <p:sp>
+        <p:nvSpPr>
+          <p:cNvPr id="20" name="Título 1">
+            <a:extLst>
+              <a:ext uri="{FF2B5EF4-FFF2-40B4-BE49-F238E27FC236}">
+                <a16:creationId xmlns:a16="http://schemas.microsoft.com/office/drawing/2014/main" id="{BFC88A97-5BBC-4C7D-BF2D-66D42FA0C9EE}"/>
+              </a:ext>
+            </a:extLst>
+          </p:cNvPr>
+          <p:cNvSpPr txBox="1">
+            <a:spLocks/>
+          </p:cNvSpPr>
+          <p:nvPr/>
+        </p:nvSpPr>
+        <p:spPr>
+          <a:xfrm>
+            <a:off x="2269435" y="1439862"/>
+            <a:ext cx="1149770" cy="758825"/>
+          </a:xfrm>
+          <a:prstGeom prst="rect">
+            <a:avLst/>
+          </a:prstGeom>
+        </p:spPr>
+        <p:txBody>
+          <a:bodyPr vert="horz" lIns="91440" tIns="45720" rIns="91440" bIns="45720" rtlCol="0" anchor="ctr">
+            <a:normAutofit/>
+          </a:bodyPr>
+          <a:lstStyle>
+            <a:lvl1pPr algn="l" defTabSz="914400" rtl="0" eaLnBrk="1" latinLnBrk="0" hangingPunct="1">
+              <a:lnSpc>
+                <a:spcPct val="90000"/>
+              </a:lnSpc>
+              <a:spcBef>
+                <a:spcPct val="0"/>
+              </a:spcBef>
+              <a:buNone/>
+              <a:defRPr sz="4400" kern="1200">
+                <a:solidFill>
+                  <a:schemeClr val="tx1"/>
+                </a:solidFill>
+                <a:latin typeface="+mj-lt"/>
+                <a:ea typeface="+mj-ea"/>
+                <a:cs typeface="+mj-cs"/>
+              </a:defRPr>
+            </a:lvl1pPr>
+          </a:lstStyle>
+          <a:p>
+            <a:r>
+              <a:rPr lang="pt-BR" sz="2800" dirty="0">
+                <a:solidFill>
+                  <a:srgbClr val="B02F75"/>
+                </a:solidFill>
+                <a:latin typeface="Dubai Medium" panose="020B0603030403030204" pitchFamily="34" charset="-78"/>
+                <a:cs typeface="Dubai Medium" panose="020B0603030403030204" pitchFamily="34" charset="-78"/>
+              </a:rPr>
+              <a:t>Home</a:t>
+            </a:r>
+            <a:endParaRPr lang="pt-BR" sz="3200" dirty="0">
+              <a:solidFill>
+                <a:srgbClr val="B02F75"/>
+              </a:solidFill>
+              <a:latin typeface="Dubai Medium" panose="020B0603030403030204" pitchFamily="34" charset="-78"/>
+              <a:cs typeface="Dubai Medium" panose="020B0603030403030204" pitchFamily="34" charset="-78"/>
+            </a:endParaRPr>
+          </a:p>
+        </p:txBody>
+      </p:sp>
+      <p:cxnSp>
+        <p:nvCxnSpPr>
+          <p:cNvPr id="21" name="Conector reto 20">
+            <a:extLst>
+              <a:ext uri="{FF2B5EF4-FFF2-40B4-BE49-F238E27FC236}">
+                <a16:creationId xmlns:a16="http://schemas.microsoft.com/office/drawing/2014/main" id="{08BD18C1-6E78-49F8-928C-9968A0CE43E8}"/>
+              </a:ext>
+            </a:extLst>
+          </p:cNvPr>
+          <p:cNvCxnSpPr>
+            <a:cxnSpLocks/>
+          </p:cNvCxnSpPr>
+          <p:nvPr/>
+        </p:nvCxnSpPr>
+        <p:spPr>
+          <a:xfrm flipH="1">
+            <a:off x="2214972" y="1955793"/>
+            <a:ext cx="1204233" cy="0"/>
+          </a:xfrm>
+          <a:prstGeom prst="line">
+            <a:avLst/>
+          </a:prstGeom>
+          <a:ln>
+            <a:solidFill>
+              <a:srgbClr val="4DB033"/>
+            </a:solidFill>
+          </a:ln>
+          <a:effectLst>
+            <a:glow rad="63500">
+              <a:srgbClr val="4DB033">
+                <a:alpha val="40000"/>
+              </a:srgbClr>
+            </a:glow>
+          </a:effectLst>
+        </p:spPr>
+        <p:style>
+          <a:lnRef idx="1">
+            <a:schemeClr val="accent1"/>
+          </a:lnRef>
+          <a:fillRef idx="0">
+            <a:schemeClr val="accent1"/>
+          </a:fillRef>
+          <a:effectRef idx="0">
+            <a:schemeClr val="accent1"/>
+          </a:effectRef>
+          <a:fontRef idx="minor">
+            <a:schemeClr val="tx1"/>
+          </a:fontRef>
+        </p:style>
+      </p:cxnSp>
+      <p:sp>
+        <p:nvSpPr>
+          <p:cNvPr id="22" name="Título 1">
+            <a:extLst>
+              <a:ext uri="{FF2B5EF4-FFF2-40B4-BE49-F238E27FC236}">
+                <a16:creationId xmlns:a16="http://schemas.microsoft.com/office/drawing/2014/main" id="{D76589F3-FB5B-4319-99A0-A17C21F0FC3F}"/>
+              </a:ext>
+            </a:extLst>
+          </p:cNvPr>
+          <p:cNvSpPr txBox="1">
+            <a:spLocks/>
+          </p:cNvSpPr>
+          <p:nvPr/>
+        </p:nvSpPr>
+        <p:spPr>
+          <a:xfrm>
+            <a:off x="7380885" y="1517553"/>
+            <a:ext cx="2289882" cy="526688"/>
+          </a:xfrm>
+          <a:prstGeom prst="rect">
+            <a:avLst/>
+          </a:prstGeom>
+        </p:spPr>
+        <p:txBody>
+          <a:bodyPr vert="horz" lIns="91440" tIns="45720" rIns="91440" bIns="45720" rtlCol="0" anchor="ctr">
+            <a:normAutofit/>
+          </a:bodyPr>
+          <a:lstStyle>
+            <a:lvl1pPr algn="l" defTabSz="914400" rtl="0" eaLnBrk="1" latinLnBrk="0" hangingPunct="1">
+              <a:lnSpc>
+                <a:spcPct val="90000"/>
+              </a:lnSpc>
+              <a:spcBef>
+                <a:spcPct val="0"/>
+              </a:spcBef>
+              <a:buNone/>
+              <a:defRPr sz="4400" kern="1200">
+                <a:solidFill>
+                  <a:schemeClr val="tx1"/>
+                </a:solidFill>
+                <a:latin typeface="+mj-lt"/>
+                <a:ea typeface="+mj-ea"/>
+                <a:cs typeface="+mj-cs"/>
+              </a:defRPr>
+            </a:lvl1pPr>
+          </a:lstStyle>
+          <a:p>
+            <a:r>
+              <a:rPr lang="pt-BR" sz="2800" dirty="0" err="1">
+                <a:solidFill>
+                  <a:srgbClr val="B02F75"/>
+                </a:solidFill>
+                <a:latin typeface="Dubai Medium" panose="020B0603030403030204" pitchFamily="34" charset="-78"/>
+                <a:cs typeface="Dubai Medium" panose="020B0603030403030204" pitchFamily="34" charset="-78"/>
+              </a:rPr>
+              <a:t>User</a:t>
+            </a:r>
+            <a:r>
+              <a:rPr lang="pt-BR" sz="2800" dirty="0">
+                <a:solidFill>
+                  <a:srgbClr val="B02F75"/>
+                </a:solidFill>
+                <a:latin typeface="Dubai Medium" panose="020B0603030403030204" pitchFamily="34" charset="-78"/>
+                <a:cs typeface="Dubai Medium" panose="020B0603030403030204" pitchFamily="34" charset="-78"/>
+              </a:rPr>
+              <a:t> comum</a:t>
+            </a:r>
+            <a:endParaRPr lang="pt-BR" sz="3200" dirty="0">
+              <a:solidFill>
+                <a:srgbClr val="B02F75"/>
+              </a:solidFill>
+              <a:latin typeface="Dubai Medium" panose="020B0603030403030204" pitchFamily="34" charset="-78"/>
+              <a:cs typeface="Dubai Medium" panose="020B0603030403030204" pitchFamily="34" charset="-78"/>
+            </a:endParaRPr>
+          </a:p>
+        </p:txBody>
+      </p:sp>
+      <p:cxnSp>
+        <p:nvCxnSpPr>
+          <p:cNvPr id="23" name="Conector reto 22">
+            <a:extLst>
+              <a:ext uri="{FF2B5EF4-FFF2-40B4-BE49-F238E27FC236}">
+                <a16:creationId xmlns:a16="http://schemas.microsoft.com/office/drawing/2014/main" id="{2214BEFE-EE33-49DD-8C57-7DA96B9D4BC5}"/>
+              </a:ext>
+            </a:extLst>
+          </p:cNvPr>
+          <p:cNvCxnSpPr>
+            <a:cxnSpLocks/>
+          </p:cNvCxnSpPr>
+          <p:nvPr/>
+        </p:nvCxnSpPr>
+        <p:spPr>
+          <a:xfrm flipH="1">
+            <a:off x="7380885" y="1955793"/>
+            <a:ext cx="1994026" cy="0"/>
+          </a:xfrm>
+          <a:prstGeom prst="line">
+            <a:avLst/>
+          </a:prstGeom>
+          <a:ln>
+            <a:solidFill>
+              <a:srgbClr val="4DB033"/>
+            </a:solidFill>
+          </a:ln>
+          <a:effectLst>
+            <a:glow rad="63500">
+              <a:srgbClr val="4DB033">
                 <a:alpha val="40000"/>
               </a:srgbClr>
             </a:glow>
@@ -9302,8 +10748,8 @@
         </p:nvSpPr>
         <p:spPr>
           <a:xfrm>
-            <a:off x="473529" y="462039"/>
-            <a:ext cx="3393621" cy="679383"/>
+            <a:off x="454479" y="450851"/>
+            <a:ext cx="3848100" cy="758825"/>
           </a:xfrm>
         </p:spPr>
         <p:txBody>
@@ -9313,31 +10759,34 @@
           <a:lstStyle/>
           <a:p>
             <a:r>
-              <a:rPr lang="pt-BR" sz="3600" dirty="0">
+              <a:rPr lang="pt-BR" sz="3200" dirty="0" err="1">
                 <a:solidFill>
                   <a:srgbClr val="4DB033"/>
                 </a:solidFill>
                 <a:latin typeface="Dubai Medium" panose="020B0603030403030204" pitchFamily="34" charset="-78"/>
                 <a:cs typeface="Dubai Medium" panose="020B0603030403030204" pitchFamily="34" charset="-78"/>
               </a:rPr>
-              <a:t>BPMN</a:t>
-            </a:r>
-            <a:endParaRPr lang="pt-BR" sz="3200" dirty="0">
-              <a:solidFill>
-                <a:srgbClr val="4DB033"/>
-              </a:solidFill>
-              <a:latin typeface="Dubai Medium" panose="020B0603030403030204" pitchFamily="34" charset="-78"/>
-              <a:cs typeface="Dubai Medium" panose="020B0603030403030204" pitchFamily="34" charset="-78"/>
-            </a:endParaRPr>
+              <a:t>Mockup’s</a:t>
+            </a:r>
+            <a:r>
+              <a:rPr lang="pt-BR" sz="3200" dirty="0">
+                <a:solidFill>
+                  <a:srgbClr val="4DB033"/>
+                </a:solidFill>
+                <a:latin typeface="Dubai Medium" panose="020B0603030403030204" pitchFamily="34" charset="-78"/>
+                <a:cs typeface="Dubai Medium" panose="020B0603030403030204" pitchFamily="34" charset="-78"/>
+              </a:rPr>
+              <a:t> de Tela</a:t>
+            </a:r>
           </a:p>
         </p:txBody>
       </p:sp>
       <p:pic>
         <p:nvPicPr>
-          <p:cNvPr id="4" name="Espaço Reservado para Conteúdo 3">
-            <a:extLst>
-              <a:ext uri="{FF2B5EF4-FFF2-40B4-BE49-F238E27FC236}">
-                <a16:creationId xmlns:a16="http://schemas.microsoft.com/office/drawing/2014/main" id="{3614C69C-1E36-4A21-AD73-CF58BAB7D587}"/>
+          <p:cNvPr id="6" name="Espaço Reservado para Conteúdo 5" descr="Uma imagem contendo desenho&#10;&#10;Descrição gerada automaticamente">
+            <a:extLst>
+              <a:ext uri="{FF2B5EF4-FFF2-40B4-BE49-F238E27FC236}">
+                <a16:creationId xmlns:a16="http://schemas.microsoft.com/office/drawing/2014/main" id="{2791291C-2F25-4C38-8180-07D1AFDDB93F}"/>
               </a:ext>
             </a:extLst>
           </p:cNvPr>
@@ -9349,19 +10798,22 @@
           </p:nvPr>
         </p:nvPicPr>
         <p:blipFill>
-          <a:blip r:embed="rId2"/>
+          <a:blip r:embed="rId2">
+            <a:extLst>
+              <a:ext uri="{28A0092B-C50C-407E-A947-70E740481C1C}">
+                <a14:useLocalDpi xmlns:a14="http://schemas.microsoft.com/office/drawing/2010/main" val="0"/>
+              </a:ext>
+            </a:extLst>
+          </a:blip>
           <a:stretch>
             <a:fillRect/>
           </a:stretch>
         </p:blipFill>
         <p:spPr>
           <a:xfrm>
-            <a:off x="860206" y="1660459"/>
-            <a:ext cx="10471588" cy="4351338"/>
-          </a:xfrm>
-          <a:prstGeom prst="rect">
-            <a:avLst/>
-          </a:prstGeom>
+            <a:off x="10286734" y="-387713"/>
+            <a:ext cx="1905266" cy="1905266"/>
+          </a:xfrm>
         </p:spPr>
       </p:pic>
       <p:cxnSp>
@@ -9381,7 +10833,7 @@
         <p:spPr>
           <a:xfrm flipH="1">
             <a:off x="1" y="981076"/>
-            <a:ext cx="2000249" cy="0"/>
+            <a:ext cx="3600449" cy="0"/>
           </a:xfrm>
           <a:prstGeom prst="line">
             <a:avLst/>
@@ -9416,10 +10868,229 @@
       </p:cxnSp>
       <p:pic>
         <p:nvPicPr>
-          <p:cNvPr id="6" name="Espaço Reservado para Conteúdo 5" descr="Uma imagem contendo desenho&#10;&#10;Descrição gerada automaticamente">
-            <a:extLst>
-              <a:ext uri="{FF2B5EF4-FFF2-40B4-BE49-F238E27FC236}">
-                <a16:creationId xmlns:a16="http://schemas.microsoft.com/office/drawing/2014/main" id="{91101F4B-3D5E-4DA2-B01E-F889604FDF48}"/>
+          <p:cNvPr id="9" name="Imagem 8" descr="Uma imagem contendo screenshot, texto&#10;&#10;Descrição gerada automaticamente">
+            <a:extLst>
+              <a:ext uri="{FF2B5EF4-FFF2-40B4-BE49-F238E27FC236}">
+                <a16:creationId xmlns:a16="http://schemas.microsoft.com/office/drawing/2014/main" id="{DAF14528-63E7-4900-AF7A-A3C07DC4140B}"/>
+              </a:ext>
+            </a:extLst>
+          </p:cNvPr>
+          <p:cNvPicPr>
+            <a:picLocks noChangeAspect="1"/>
+          </p:cNvPicPr>
+          <p:nvPr/>
+        </p:nvPicPr>
+        <p:blipFill rotWithShape="1">
+          <a:blip r:embed="rId3">
+            <a:extLst>
+              <a:ext uri="{28A0092B-C50C-407E-A947-70E740481C1C}">
+                <a14:useLocalDpi xmlns:a14="http://schemas.microsoft.com/office/drawing/2010/main" val="0"/>
+              </a:ext>
+            </a:extLst>
+          </a:blip>
+          <a:srcRect l="7589" r="7358"/>
+          <a:stretch/>
+        </p:blipFill>
+        <p:spPr>
+          <a:xfrm>
+            <a:off x="6702946" y="2166250"/>
+            <a:ext cx="3368719" cy="4534812"/>
+          </a:xfrm>
+          <a:prstGeom prst="rect">
+            <a:avLst/>
+          </a:prstGeom>
+        </p:spPr>
+      </p:pic>
+      <p:sp>
+        <p:nvSpPr>
+          <p:cNvPr id="12" name="Título 1">
+            <a:extLst>
+              <a:ext uri="{FF2B5EF4-FFF2-40B4-BE49-F238E27FC236}">
+                <a16:creationId xmlns:a16="http://schemas.microsoft.com/office/drawing/2014/main" id="{34BC7073-C951-4468-9492-2585FA0F28D4}"/>
+              </a:ext>
+            </a:extLst>
+          </p:cNvPr>
+          <p:cNvSpPr txBox="1">
+            <a:spLocks/>
+          </p:cNvSpPr>
+          <p:nvPr/>
+        </p:nvSpPr>
+        <p:spPr>
+          <a:xfrm>
+            <a:off x="1378858" y="1439861"/>
+            <a:ext cx="3403229" cy="758825"/>
+          </a:xfrm>
+          <a:prstGeom prst="rect">
+            <a:avLst/>
+          </a:prstGeom>
+        </p:spPr>
+        <p:txBody>
+          <a:bodyPr vert="horz" lIns="91440" tIns="45720" rIns="91440" bIns="45720" rtlCol="0" anchor="ctr">
+            <a:normAutofit/>
+          </a:bodyPr>
+          <a:lstStyle>
+            <a:lvl1pPr algn="l" defTabSz="914400" rtl="0" eaLnBrk="1" latinLnBrk="0" hangingPunct="1">
+              <a:lnSpc>
+                <a:spcPct val="90000"/>
+              </a:lnSpc>
+              <a:spcBef>
+                <a:spcPct val="0"/>
+              </a:spcBef>
+              <a:buNone/>
+              <a:defRPr sz="4400" kern="1200">
+                <a:solidFill>
+                  <a:schemeClr val="tx1"/>
+                </a:solidFill>
+                <a:latin typeface="+mj-lt"/>
+                <a:ea typeface="+mj-ea"/>
+                <a:cs typeface="+mj-cs"/>
+              </a:defRPr>
+            </a:lvl1pPr>
+          </a:lstStyle>
+          <a:p>
+            <a:r>
+              <a:rPr lang="pt-BR" sz="2800" dirty="0">
+                <a:solidFill>
+                  <a:srgbClr val="B02F75"/>
+                </a:solidFill>
+                <a:latin typeface="Dubai Medium" panose="020B0603030403030204" pitchFamily="34" charset="-78"/>
+                <a:cs typeface="Dubai Medium" panose="020B0603030403030204" pitchFamily="34" charset="-78"/>
+              </a:rPr>
+              <a:t>Gráfico de histórico</a:t>
+            </a:r>
+            <a:endParaRPr lang="pt-BR" sz="3200" dirty="0">
+              <a:solidFill>
+                <a:srgbClr val="B02F75"/>
+              </a:solidFill>
+              <a:latin typeface="Dubai Medium" panose="020B0603030403030204" pitchFamily="34" charset="-78"/>
+              <a:cs typeface="Dubai Medium" panose="020B0603030403030204" pitchFamily="34" charset="-78"/>
+            </a:endParaRPr>
+          </a:p>
+        </p:txBody>
+      </p:sp>
+      <p:cxnSp>
+        <p:nvCxnSpPr>
+          <p:cNvPr id="13" name="Conector reto 12">
+            <a:extLst>
+              <a:ext uri="{FF2B5EF4-FFF2-40B4-BE49-F238E27FC236}">
+                <a16:creationId xmlns:a16="http://schemas.microsoft.com/office/drawing/2014/main" id="{11823D0E-8894-46D5-9D9D-D8553E3AF000}"/>
+              </a:ext>
+            </a:extLst>
+          </p:cNvPr>
+          <p:cNvCxnSpPr>
+            <a:cxnSpLocks/>
+          </p:cNvCxnSpPr>
+          <p:nvPr/>
+        </p:nvCxnSpPr>
+        <p:spPr>
+          <a:xfrm flipH="1">
+            <a:off x="1248229" y="1955793"/>
+            <a:ext cx="3222172" cy="0"/>
+          </a:xfrm>
+          <a:prstGeom prst="line">
+            <a:avLst/>
+          </a:prstGeom>
+          <a:ln>
+            <a:solidFill>
+              <a:srgbClr val="4DB033"/>
+            </a:solidFill>
+          </a:ln>
+          <a:effectLst>
+            <a:glow rad="63500">
+              <a:srgbClr val="4DB033">
+                <a:alpha val="40000"/>
+              </a:srgbClr>
+            </a:glow>
+          </a:effectLst>
+        </p:spPr>
+        <p:style>
+          <a:lnRef idx="1">
+            <a:schemeClr val="accent1"/>
+          </a:lnRef>
+          <a:fillRef idx="0">
+            <a:schemeClr val="accent1"/>
+          </a:fillRef>
+          <a:effectRef idx="0">
+            <a:schemeClr val="accent1"/>
+          </a:effectRef>
+          <a:fontRef idx="minor">
+            <a:schemeClr val="tx1"/>
+          </a:fontRef>
+        </p:style>
+      </p:cxnSp>
+      <p:sp>
+        <p:nvSpPr>
+          <p:cNvPr id="14" name="Título 1">
+            <a:extLst>
+              <a:ext uri="{FF2B5EF4-FFF2-40B4-BE49-F238E27FC236}">
+                <a16:creationId xmlns:a16="http://schemas.microsoft.com/office/drawing/2014/main" id="{73342C37-5A86-428F-94F1-47C9F6F70B02}"/>
+              </a:ext>
+            </a:extLst>
+          </p:cNvPr>
+          <p:cNvSpPr txBox="1">
+            <a:spLocks/>
+          </p:cNvSpPr>
+          <p:nvPr/>
+        </p:nvSpPr>
+        <p:spPr>
+          <a:xfrm>
+            <a:off x="7014497" y="1555930"/>
+            <a:ext cx="3769617" cy="526688"/>
+          </a:xfrm>
+          <a:prstGeom prst="rect">
+            <a:avLst/>
+          </a:prstGeom>
+        </p:spPr>
+        <p:txBody>
+          <a:bodyPr vert="horz" lIns="91440" tIns="45720" rIns="91440" bIns="45720" rtlCol="0" anchor="ctr">
+            <a:normAutofit/>
+          </a:bodyPr>
+          <a:lstStyle>
+            <a:lvl1pPr algn="l" defTabSz="914400" rtl="0" eaLnBrk="1" latinLnBrk="0" hangingPunct="1">
+              <a:lnSpc>
+                <a:spcPct val="90000"/>
+              </a:lnSpc>
+              <a:spcBef>
+                <a:spcPct val="0"/>
+              </a:spcBef>
+              <a:buNone/>
+              <a:defRPr sz="4400" kern="1200">
+                <a:solidFill>
+                  <a:schemeClr val="tx1"/>
+                </a:solidFill>
+                <a:latin typeface="+mj-lt"/>
+                <a:ea typeface="+mj-ea"/>
+                <a:cs typeface="+mj-cs"/>
+              </a:defRPr>
+            </a:lvl1pPr>
+          </a:lstStyle>
+          <a:p>
+            <a:r>
+              <a:rPr lang="pt-BR" sz="2800" dirty="0">
+                <a:solidFill>
+                  <a:srgbClr val="B02F75"/>
+                </a:solidFill>
+                <a:latin typeface="Dubai Medium" panose="020B0603030403030204" pitchFamily="34" charset="-78"/>
+                <a:cs typeface="Dubai Medium" panose="020B0603030403030204" pitchFamily="34" charset="-78"/>
+              </a:rPr>
+              <a:t>Gráfico tempo real </a:t>
+            </a:r>
+            <a:endParaRPr lang="pt-BR" sz="3200" dirty="0">
+              <a:solidFill>
+                <a:srgbClr val="B02F75"/>
+              </a:solidFill>
+              <a:latin typeface="Dubai Medium" panose="020B0603030403030204" pitchFamily="34" charset="-78"/>
+              <a:cs typeface="Dubai Medium" panose="020B0603030403030204" pitchFamily="34" charset="-78"/>
+            </a:endParaRPr>
+          </a:p>
+        </p:txBody>
+      </p:sp>
+      <p:pic>
+        <p:nvPicPr>
+          <p:cNvPr id="7" name="Imagem 6" descr="Uma imagem contendo screenshot, texto&#10;&#10;Descrição gerada automaticamente">
+            <a:extLst>
+              <a:ext uri="{FF2B5EF4-FFF2-40B4-BE49-F238E27FC236}">
+                <a16:creationId xmlns:a16="http://schemas.microsoft.com/office/drawing/2014/main" id="{8092B0CD-EBD8-4CCF-B60D-4532B74A6137}"/>
               </a:ext>
             </a:extLst>
           </p:cNvPr>
@@ -9429,7 +11100,7 @@
           <p:nvPr/>
         </p:nvPicPr>
         <p:blipFill>
-          <a:blip r:embed="rId3">
+          <a:blip r:embed="rId4">
             <a:extLst>
               <a:ext uri="{28A0092B-C50C-407E-A947-70E740481C1C}">
                 <a14:useLocalDpi xmlns:a14="http://schemas.microsoft.com/office/drawing/2010/main" val="0"/>
@@ -9442,18 +11113,68 @@
         </p:blipFill>
         <p:spPr>
           <a:xfrm>
-            <a:off x="10286734" y="-387713"/>
-            <a:ext cx="1905266" cy="1905266"/>
+            <a:off x="1042641" y="2128186"/>
+            <a:ext cx="3816333" cy="4572875"/>
           </a:xfrm>
           <a:prstGeom prst="rect">
             <a:avLst/>
           </a:prstGeom>
         </p:spPr>
       </p:pic>
+      <p:cxnSp>
+        <p:nvCxnSpPr>
+          <p:cNvPr id="18" name="Conector reto 17">
+            <a:extLst>
+              <a:ext uri="{FF2B5EF4-FFF2-40B4-BE49-F238E27FC236}">
+                <a16:creationId xmlns:a16="http://schemas.microsoft.com/office/drawing/2014/main" id="{77FA3231-D5CD-4EAB-8528-1B775411B30C}"/>
+              </a:ext>
+            </a:extLst>
+          </p:cNvPr>
+          <p:cNvCxnSpPr>
+            <a:cxnSpLocks/>
+          </p:cNvCxnSpPr>
+          <p:nvPr/>
+        </p:nvCxnSpPr>
+        <p:spPr>
+          <a:xfrm flipH="1">
+            <a:off x="7014497" y="2004320"/>
+            <a:ext cx="2983893" cy="0"/>
+          </a:xfrm>
+          <a:prstGeom prst="line">
+            <a:avLst/>
+          </a:prstGeom>
+          <a:ln>
+            <a:solidFill>
+              <a:srgbClr val="4DB033"/>
+            </a:solidFill>
+          </a:ln>
+          <a:effectLst>
+            <a:glow rad="63500">
+              <a:srgbClr val="4DB033">
+                <a:alpha val="40000"/>
+              </a:srgbClr>
+            </a:glow>
+          </a:effectLst>
+        </p:spPr>
+        <p:style>
+          <a:lnRef idx="1">
+            <a:schemeClr val="accent1"/>
+          </a:lnRef>
+          <a:fillRef idx="0">
+            <a:schemeClr val="accent1"/>
+          </a:fillRef>
+          <a:effectRef idx="0">
+            <a:schemeClr val="accent1"/>
+          </a:effectRef>
+          <a:fontRef idx="minor">
+            <a:schemeClr val="tx1"/>
+          </a:fontRef>
+        </p:style>
+      </p:cxnSp>
     </p:spTree>
     <p:extLst>
       <p:ext uri="{BB962C8B-B14F-4D97-AF65-F5344CB8AC3E}">
-        <p14:creationId xmlns:p14="http://schemas.microsoft.com/office/powerpoint/2010/main" val="1140925884"/>
+        <p14:creationId xmlns:p14="http://schemas.microsoft.com/office/powerpoint/2010/main" val="539328629"/>
       </p:ext>
     </p:extLst>
   </p:cSld>
@@ -9480,35 +11201,6 @@
           <a:chExt cx="0" cy="0"/>
         </a:xfrm>
       </p:grpSpPr>
-      <p:pic>
-        <p:nvPicPr>
-          <p:cNvPr id="4" name="Imagem 3">
-            <a:extLst>
-              <a:ext uri="{FF2B5EF4-FFF2-40B4-BE49-F238E27FC236}">
-                <a16:creationId xmlns:a16="http://schemas.microsoft.com/office/drawing/2014/main" id="{806584D7-5007-4AFD-9399-0ADA9FF03127}"/>
-              </a:ext>
-            </a:extLst>
-          </p:cNvPr>
-          <p:cNvPicPr>
-            <a:picLocks noChangeAspect="1"/>
-          </p:cNvPicPr>
-          <p:nvPr/>
-        </p:nvPicPr>
-        <p:blipFill rotWithShape="1">
-          <a:blip r:embed="rId2"/>
-          <a:srcRect t="343" r="1433" b="484"/>
-          <a:stretch/>
-        </p:blipFill>
-        <p:spPr>
-          <a:xfrm>
-            <a:off x="1179873" y="1228725"/>
-            <a:ext cx="9691328" cy="5505904"/>
-          </a:xfrm>
-          <a:prstGeom prst="rect">
-            <a:avLst/>
-          </a:prstGeom>
-        </p:spPr>
-      </p:pic>
       <p:sp>
         <p:nvSpPr>
           <p:cNvPr id="2" name="Título 1">
@@ -9527,8 +11219,8 @@
         </p:nvSpPr>
         <p:spPr>
           <a:xfrm>
-            <a:off x="454479" y="450851"/>
-            <a:ext cx="3848100" cy="758825"/>
+            <a:off x="473529" y="462039"/>
+            <a:ext cx="3393621" cy="679383"/>
           </a:xfrm>
         </p:spPr>
         <p:txBody>
@@ -9538,15 +11230,22 @@
           <a:lstStyle/>
           <a:p>
             <a:r>
-              <a:rPr lang="pt-BR" sz="3200" dirty="0">
+              <a:rPr lang="pt-BR" sz="3600" dirty="0">
                 <a:solidFill>
                   <a:srgbClr val="4DB033"/>
                 </a:solidFill>
                 <a:latin typeface="Dubai Medium" panose="020B0603030403030204" pitchFamily="34" charset="-78"/>
                 <a:cs typeface="Dubai Medium" panose="020B0603030403030204" pitchFamily="34" charset="-78"/>
               </a:rPr>
-              <a:t>Diagrama de Solução</a:t>
-            </a:r>
+              <a:t>BPMN</a:t>
+            </a:r>
+            <a:endParaRPr lang="pt-BR" sz="3200" dirty="0">
+              <a:solidFill>
+                <a:srgbClr val="4DB033"/>
+              </a:solidFill>
+              <a:latin typeface="Dubai Medium" panose="020B0603030403030204" pitchFamily="34" charset="-78"/>
+              <a:cs typeface="Dubai Medium" panose="020B0603030403030204" pitchFamily="34" charset="-78"/>
+            </a:endParaRPr>
           </a:p>
         </p:txBody>
       </p:sp>
@@ -9566,8 +11265,8 @@
         </p:nvCxnSpPr>
         <p:spPr>
           <a:xfrm flipH="1">
-            <a:off x="0" y="981076"/>
-            <a:ext cx="4067177" cy="0"/>
+            <a:off x="1" y="981076"/>
+            <a:ext cx="2000249" cy="0"/>
           </a:xfrm>
           <a:prstGeom prst="line">
             <a:avLst/>
@@ -9602,10 +11301,10 @@
       </p:cxnSp>
       <p:pic>
         <p:nvPicPr>
-          <p:cNvPr id="5" name="Espaço Reservado para Conteúdo 5" descr="Uma imagem contendo desenho&#10;&#10;Descrição gerada automaticamente">
-            <a:extLst>
-              <a:ext uri="{FF2B5EF4-FFF2-40B4-BE49-F238E27FC236}">
-                <a16:creationId xmlns:a16="http://schemas.microsoft.com/office/drawing/2014/main" id="{E3A68BA6-C565-404A-85FD-C016A2F4F627}"/>
+          <p:cNvPr id="6" name="Espaço Reservado para Conteúdo 5" descr="Uma imagem contendo desenho&#10;&#10;Descrição gerada automaticamente">
+            <a:extLst>
+              <a:ext uri="{FF2B5EF4-FFF2-40B4-BE49-F238E27FC236}">
+                <a16:creationId xmlns:a16="http://schemas.microsoft.com/office/drawing/2014/main" id="{91101F4B-3D5E-4DA2-B01E-F889604FDF48}"/>
               </a:ext>
             </a:extLst>
           </p:cNvPr>
@@ -9615,7 +11314,7 @@
           <p:nvPr/>
         </p:nvPicPr>
         <p:blipFill>
-          <a:blip r:embed="rId3">
+          <a:blip r:embed="rId2">
             <a:extLst>
               <a:ext uri="{28A0092B-C50C-407E-A947-70E740481C1C}">
                 <a14:useLocalDpi xmlns:a14="http://schemas.microsoft.com/office/drawing/2010/main" val="0"/>
@@ -9636,10 +11335,65 @@
           </a:prstGeom>
         </p:spPr>
       </p:pic>
+      <p:sp>
+        <p:nvSpPr>
+          <p:cNvPr id="5" name="Espaço Reservado para Conteúdo 4">
+            <a:extLst>
+              <a:ext uri="{FF2B5EF4-FFF2-40B4-BE49-F238E27FC236}">
+                <a16:creationId xmlns:a16="http://schemas.microsoft.com/office/drawing/2014/main" id="{155942E8-4CF3-4E7D-A207-67325DD0E71D}"/>
+              </a:ext>
+            </a:extLst>
+          </p:cNvPr>
+          <p:cNvSpPr>
+            <a:spLocks noGrp="1"/>
+          </p:cNvSpPr>
+          <p:nvPr>
+            <p:ph idx="1"/>
+          </p:nvPr>
+        </p:nvSpPr>
+        <p:spPr/>
+        <p:txBody>
+          <a:bodyPr/>
+          <a:lstStyle/>
+          <a:p>
+            <a:endParaRPr lang="pt-BR"/>
+          </a:p>
+        </p:txBody>
+      </p:sp>
+      <p:pic>
+        <p:nvPicPr>
+          <p:cNvPr id="3" name="Imagem 2">
+            <a:extLst>
+              <a:ext uri="{FF2B5EF4-FFF2-40B4-BE49-F238E27FC236}">
+                <a16:creationId xmlns:a16="http://schemas.microsoft.com/office/drawing/2014/main" id="{67205109-77C6-4F84-B059-2D7CC6F0A5A7}"/>
+              </a:ext>
+            </a:extLst>
+          </p:cNvPr>
+          <p:cNvPicPr>
+            <a:picLocks noChangeAspect="1"/>
+          </p:cNvPicPr>
+          <p:nvPr/>
+        </p:nvPicPr>
+        <p:blipFill>
+          <a:blip r:embed="rId3"/>
+          <a:stretch>
+            <a:fillRect/>
+          </a:stretch>
+        </p:blipFill>
+        <p:spPr>
+          <a:xfrm>
+            <a:off x="0" y="1289149"/>
+            <a:ext cx="12410963" cy="4887802"/>
+          </a:xfrm>
+          <a:prstGeom prst="rect">
+            <a:avLst/>
+          </a:prstGeom>
+        </p:spPr>
+      </p:pic>
     </p:spTree>
     <p:extLst>
       <p:ext uri="{BB962C8B-B14F-4D97-AF65-F5344CB8AC3E}">
-        <p14:creationId xmlns:p14="http://schemas.microsoft.com/office/powerpoint/2010/main" val="2891506774"/>
+        <p14:creationId xmlns:p14="http://schemas.microsoft.com/office/powerpoint/2010/main" val="1140925884"/>
       </p:ext>
     </p:extLst>
   </p:cSld>
@@ -9666,41 +11420,6 @@
           <a:chExt cx="0" cy="0"/>
         </a:xfrm>
       </p:grpSpPr>
-      <p:pic>
-        <p:nvPicPr>
-          <p:cNvPr id="12" name="Espaço Reservado para Conteúdo 11" descr="Tela de celular com texto preto sobre fundo branco&#10;&#10;Descrição gerada automaticamente">
-            <a:extLst>
-              <a:ext uri="{FF2B5EF4-FFF2-40B4-BE49-F238E27FC236}">
-                <a16:creationId xmlns:a16="http://schemas.microsoft.com/office/drawing/2014/main" id="{15E3F733-7528-4B05-BCE5-0A3FBA8E6B20}"/>
-              </a:ext>
-            </a:extLst>
-          </p:cNvPr>
-          <p:cNvPicPr>
-            <a:picLocks noGrp="1" noChangeAspect="1"/>
-          </p:cNvPicPr>
-          <p:nvPr>
-            <p:ph idx="1"/>
-          </p:nvPr>
-        </p:nvPicPr>
-        <p:blipFill>
-          <a:blip r:embed="rId2">
-            <a:extLst>
-              <a:ext uri="{28A0092B-C50C-407E-A947-70E740481C1C}">
-                <a14:useLocalDpi xmlns:a14="http://schemas.microsoft.com/office/drawing/2010/main" val="0"/>
-              </a:ext>
-            </a:extLst>
-          </a:blip>
-          <a:stretch>
-            <a:fillRect/>
-          </a:stretch>
-        </p:blipFill>
-        <p:spPr>
-          <a:xfrm>
-            <a:off x="2064775" y="165053"/>
-            <a:ext cx="8347586" cy="6605584"/>
-          </a:xfrm>
-        </p:spPr>
-      </p:pic>
       <p:sp>
         <p:nvSpPr>
           <p:cNvPr id="2" name="Título 1">
@@ -9719,8 +11438,8 @@
         </p:nvSpPr>
         <p:spPr>
           <a:xfrm>
-            <a:off x="285136" y="464015"/>
-            <a:ext cx="5412921" cy="660399"/>
+            <a:off x="454479" y="450851"/>
+            <a:ext cx="3848100" cy="758825"/>
           </a:xfrm>
         </p:spPr>
         <p:txBody>
@@ -9737,7 +11456,7 @@
                 <a:latin typeface="Dubai Medium" panose="020B0603030403030204" pitchFamily="34" charset="-78"/>
                 <a:cs typeface="Dubai Medium" panose="020B0603030403030204" pitchFamily="34" charset="-78"/>
               </a:rPr>
-              <a:t>Diagrama Lógico BD</a:t>
+              <a:t>Diagrama de Solução</a:t>
             </a:r>
           </a:p>
         </p:txBody>
@@ -9758,8 +11477,8 @@
         </p:nvCxnSpPr>
         <p:spPr>
           <a:xfrm flipH="1">
-            <a:off x="2" y="981076"/>
-            <a:ext cx="4129546" cy="0"/>
+            <a:off x="0" y="981076"/>
+            <a:ext cx="4067177" cy="0"/>
           </a:xfrm>
           <a:prstGeom prst="line">
             <a:avLst/>
@@ -9794,10 +11513,46 @@
       </p:cxnSp>
       <p:pic>
         <p:nvPicPr>
-          <p:cNvPr id="6" name="Espaço Reservado para Conteúdo 5" descr="Uma imagem contendo desenho&#10;&#10;Descrição gerada automaticamente">
-            <a:extLst>
-              <a:ext uri="{FF2B5EF4-FFF2-40B4-BE49-F238E27FC236}">
-                <a16:creationId xmlns:a16="http://schemas.microsoft.com/office/drawing/2014/main" id="{47A08B82-963C-4891-9394-22966D814E73}"/>
+          <p:cNvPr id="5" name="Espaço Reservado para Conteúdo 5" descr="Uma imagem contendo desenho&#10;&#10;Descrição gerada automaticamente">
+            <a:extLst>
+              <a:ext uri="{FF2B5EF4-FFF2-40B4-BE49-F238E27FC236}">
+                <a16:creationId xmlns:a16="http://schemas.microsoft.com/office/drawing/2014/main" id="{E3A68BA6-C565-404A-85FD-C016A2F4F627}"/>
+              </a:ext>
+            </a:extLst>
+          </p:cNvPr>
+          <p:cNvPicPr>
+            <a:picLocks noChangeAspect="1"/>
+          </p:cNvPicPr>
+          <p:nvPr/>
+        </p:nvPicPr>
+        <p:blipFill>
+          <a:blip r:embed="rId2">
+            <a:extLst>
+              <a:ext uri="{28A0092B-C50C-407E-A947-70E740481C1C}">
+                <a14:useLocalDpi xmlns:a14="http://schemas.microsoft.com/office/drawing/2010/main" val="0"/>
+              </a:ext>
+            </a:extLst>
+          </a:blip>
+          <a:stretch>
+            <a:fillRect/>
+          </a:stretch>
+        </p:blipFill>
+        <p:spPr>
+          <a:xfrm>
+            <a:off x="10286734" y="-387713"/>
+            <a:ext cx="1905266" cy="1905266"/>
+          </a:xfrm>
+          <a:prstGeom prst="rect">
+            <a:avLst/>
+          </a:prstGeom>
+        </p:spPr>
+      </p:pic>
+      <p:pic>
+        <p:nvPicPr>
+          <p:cNvPr id="8" name="Imagem 7" descr="Uma imagem contendo screenshot&#10;&#10;Descrição gerada automaticamente">
+            <a:extLst>
+              <a:ext uri="{FF2B5EF4-FFF2-40B4-BE49-F238E27FC236}">
+                <a16:creationId xmlns:a16="http://schemas.microsoft.com/office/drawing/2014/main" id="{107F6E7A-138D-468B-A018-0082B42F9018}"/>
               </a:ext>
             </a:extLst>
           </p:cNvPr>
@@ -9820,8 +11575,8 @@
         </p:blipFill>
         <p:spPr>
           <a:xfrm>
-            <a:off x="10286734" y="-387713"/>
-            <a:ext cx="1905266" cy="1905266"/>
+            <a:off x="1628982" y="1054110"/>
+            <a:ext cx="9410079" cy="5353039"/>
           </a:xfrm>
           <a:prstGeom prst="rect">
             <a:avLst/>
@@ -9831,7 +11586,7 @@
     </p:spTree>
     <p:extLst>
       <p:ext uri="{BB962C8B-B14F-4D97-AF65-F5344CB8AC3E}">
-        <p14:creationId xmlns:p14="http://schemas.microsoft.com/office/powerpoint/2010/main" val="384798924"/>
+        <p14:creationId xmlns:p14="http://schemas.microsoft.com/office/powerpoint/2010/main" val="2891506774"/>
       </p:ext>
     </p:extLst>
   </p:cSld>
@@ -10100,4 +11855,299 @@
     </a:ext>
   </a:extLst>
 </a:theme>
+</file>
+
+<file path=ppt/theme/theme2.xml><?xml version="1.0" encoding="utf-8"?>
+<a:theme xmlns:a="http://schemas.openxmlformats.org/drawingml/2006/main" name="Tema do Office">
+  <a:themeElements>
+    <a:clrScheme name="Office">
+      <a:dk1>
+        <a:sysClr val="windowText" lastClr="000000"/>
+      </a:dk1>
+      <a:lt1>
+        <a:sysClr val="window" lastClr="FFFFFF"/>
+      </a:lt1>
+      <a:dk2>
+        <a:srgbClr val="44546A"/>
+      </a:dk2>
+      <a:lt2>
+        <a:srgbClr val="E7E6E6"/>
+      </a:lt2>
+      <a:accent1>
+        <a:srgbClr val="4472C4"/>
+      </a:accent1>
+      <a:accent2>
+        <a:srgbClr val="ED7D31"/>
+      </a:accent2>
+      <a:accent3>
+        <a:srgbClr val="A5A5A5"/>
+      </a:accent3>
+      <a:accent4>
+        <a:srgbClr val="FFC000"/>
+      </a:accent4>
+      <a:accent5>
+        <a:srgbClr val="5B9BD5"/>
+      </a:accent5>
+      <a:accent6>
+        <a:srgbClr val="70AD47"/>
+      </a:accent6>
+      <a:hlink>
+        <a:srgbClr val="0563C1"/>
+      </a:hlink>
+      <a:folHlink>
+        <a:srgbClr val="954F72"/>
+      </a:folHlink>
+    </a:clrScheme>
+    <a:fontScheme name="Office">
+      <a:majorFont>
+        <a:latin typeface="Calibri Light" panose="020F0302020204030204"/>
+        <a:ea typeface=""/>
+        <a:cs typeface=""/>
+        <a:font script="Jpan" typeface="游ゴシック Light"/>
+        <a:font script="Hang" typeface="맑은 고딕"/>
+        <a:font script="Hans" typeface="等线 Light"/>
+        <a:font script="Hant" typeface="新細明體"/>
+        <a:font script="Arab" typeface="Times New Roman"/>
+        <a:font script="Hebr" typeface="Times New Roman"/>
+        <a:font script="Thai" typeface="Angsana New"/>
+        <a:font script="Ethi" typeface="Nyala"/>
+        <a:font script="Beng" typeface="Vrinda"/>
+        <a:font script="Gujr" typeface="Shruti"/>
+        <a:font script="Khmr" typeface="MoolBoran"/>
+        <a:font script="Knda" typeface="Tunga"/>
+        <a:font script="Guru" typeface="Raavi"/>
+        <a:font script="Cans" typeface="Euphemia"/>
+        <a:font script="Cher" typeface="Plantagenet Cherokee"/>
+        <a:font script="Yiii" typeface="Microsoft Yi Baiti"/>
+        <a:font script="Tibt" typeface="Microsoft Himalaya"/>
+        <a:font script="Thaa" typeface="MV Boli"/>
+        <a:font script="Deva" typeface="Mangal"/>
+        <a:font script="Telu" typeface="Gautami"/>
+        <a:font script="Taml" typeface="Latha"/>
+        <a:font script="Syrc" typeface="Estrangelo Edessa"/>
+        <a:font script="Orya" typeface="Kalinga"/>
+        <a:font script="Mlym" typeface="Kartika"/>
+        <a:font script="Laoo" typeface="DokChampa"/>
+        <a:font script="Sinh" typeface="Iskoola Pota"/>
+        <a:font script="Mong" typeface="Mongolian Baiti"/>
+        <a:font script="Viet" typeface="Times New Roman"/>
+        <a:font script="Uigh" typeface="Microsoft Uighur"/>
+        <a:font script="Geor" typeface="Sylfaen"/>
+        <a:font script="Armn" typeface="Arial"/>
+        <a:font script="Bugi" typeface="Leelawadee UI"/>
+        <a:font script="Bopo" typeface="Microsoft JhengHei"/>
+        <a:font script="Java" typeface="Javanese Text"/>
+        <a:font script="Lisu" typeface="Segoe UI"/>
+        <a:font script="Mymr" typeface="Myanmar Text"/>
+        <a:font script="Nkoo" typeface="Ebrima"/>
+        <a:font script="Olck" typeface="Nirmala UI"/>
+        <a:font script="Osma" typeface="Ebrima"/>
+        <a:font script="Phag" typeface="Phagspa"/>
+        <a:font script="Syrn" typeface="Estrangelo Edessa"/>
+        <a:font script="Syrj" typeface="Estrangelo Edessa"/>
+        <a:font script="Syre" typeface="Estrangelo Edessa"/>
+        <a:font script="Sora" typeface="Nirmala UI"/>
+        <a:font script="Tale" typeface="Microsoft Tai Le"/>
+        <a:font script="Talu" typeface="Microsoft New Tai Lue"/>
+        <a:font script="Tfng" typeface="Ebrima"/>
+      </a:majorFont>
+      <a:minorFont>
+        <a:latin typeface="Calibri" panose="020F0502020204030204"/>
+        <a:ea typeface=""/>
+        <a:cs typeface=""/>
+        <a:font script="Jpan" typeface="游ゴシック"/>
+        <a:font script="Hang" typeface="맑은 고딕"/>
+        <a:font script="Hans" typeface="等线"/>
+        <a:font script="Hant" typeface="新細明體"/>
+        <a:font script="Arab" typeface="Arial"/>
+        <a:font script="Hebr" typeface="Arial"/>
+        <a:font script="Thai" typeface="Cordia New"/>
+        <a:font script="Ethi" typeface="Nyala"/>
+        <a:font script="Beng" typeface="Vrinda"/>
+        <a:font script="Gujr" typeface="Shruti"/>
+        <a:font script="Khmr" typeface="DaunPenh"/>
+        <a:font script="Knda" typeface="Tunga"/>
+        <a:font script="Guru" typeface="Raavi"/>
+        <a:font script="Cans" typeface="Euphemia"/>
+        <a:font script="Cher" typeface="Plantagenet Cherokee"/>
+        <a:font script="Yiii" typeface="Microsoft Yi Baiti"/>
+        <a:font script="Tibt" typeface="Microsoft Himalaya"/>
+        <a:font script="Thaa" typeface="MV Boli"/>
+        <a:font script="Deva" typeface="Mangal"/>
+        <a:font script="Telu" typeface="Gautami"/>
+        <a:font script="Taml" typeface="Latha"/>
+        <a:font script="Syrc" typeface="Estrangelo Edessa"/>
+        <a:font script="Orya" typeface="Kalinga"/>
+        <a:font script="Mlym" typeface="Kartika"/>
+        <a:font script="Laoo" typeface="DokChampa"/>
+        <a:font script="Sinh" typeface="Iskoola Pota"/>
+        <a:font script="Mong" typeface="Mongolian Baiti"/>
+        <a:font script="Viet" typeface="Arial"/>
+        <a:font script="Uigh" typeface="Microsoft Uighur"/>
+        <a:font script="Geor" typeface="Sylfaen"/>
+        <a:font script="Armn" typeface="Arial"/>
+        <a:font script="Bugi" typeface="Leelawadee UI"/>
+        <a:font script="Bopo" typeface="Microsoft JhengHei"/>
+        <a:font script="Java" typeface="Javanese Text"/>
+        <a:font script="Lisu" typeface="Segoe UI"/>
+        <a:font script="Mymr" typeface="Myanmar Text"/>
+        <a:font script="Nkoo" typeface="Ebrima"/>
+        <a:font script="Olck" typeface="Nirmala UI"/>
+        <a:font script="Osma" typeface="Ebrima"/>
+        <a:font script="Phag" typeface="Phagspa"/>
+        <a:font script="Syrn" typeface="Estrangelo Edessa"/>
+        <a:font script="Syrj" typeface="Estrangelo Edessa"/>
+        <a:font script="Syre" typeface="Estrangelo Edessa"/>
+        <a:font script="Sora" typeface="Nirmala UI"/>
+        <a:font script="Tale" typeface="Microsoft Tai Le"/>
+        <a:font script="Talu" typeface="Microsoft New Tai Lue"/>
+        <a:font script="Tfng" typeface="Ebrima"/>
+      </a:minorFont>
+    </a:fontScheme>
+    <a:fmtScheme name="Office">
+      <a:fillStyleLst>
+        <a:solidFill>
+          <a:schemeClr val="phClr"/>
+        </a:solidFill>
+        <a:gradFill rotWithShape="1">
+          <a:gsLst>
+            <a:gs pos="0">
+              <a:schemeClr val="phClr">
+                <a:lumMod val="110000"/>
+                <a:satMod val="105000"/>
+                <a:tint val="67000"/>
+              </a:schemeClr>
+            </a:gs>
+            <a:gs pos="50000">
+              <a:schemeClr val="phClr">
+                <a:lumMod val="105000"/>
+                <a:satMod val="103000"/>
+                <a:tint val="73000"/>
+              </a:schemeClr>
+            </a:gs>
+            <a:gs pos="100000">
+              <a:schemeClr val="phClr">
+                <a:lumMod val="105000"/>
+                <a:satMod val="109000"/>
+                <a:tint val="81000"/>
+              </a:schemeClr>
+            </a:gs>
+          </a:gsLst>
+          <a:lin ang="5400000" scaled="0"/>
+        </a:gradFill>
+        <a:gradFill rotWithShape="1">
+          <a:gsLst>
+            <a:gs pos="0">
+              <a:schemeClr val="phClr">
+                <a:satMod val="103000"/>
+                <a:lumMod val="102000"/>
+                <a:tint val="94000"/>
+              </a:schemeClr>
+            </a:gs>
+            <a:gs pos="50000">
+              <a:schemeClr val="phClr">
+                <a:satMod val="110000"/>
+                <a:lumMod val="100000"/>
+                <a:shade val="100000"/>
+              </a:schemeClr>
+            </a:gs>
+            <a:gs pos="100000">
+              <a:schemeClr val="phClr">
+                <a:lumMod val="99000"/>
+                <a:satMod val="120000"/>
+                <a:shade val="78000"/>
+              </a:schemeClr>
+            </a:gs>
+          </a:gsLst>
+          <a:lin ang="5400000" scaled="0"/>
+        </a:gradFill>
+      </a:fillStyleLst>
+      <a:lnStyleLst>
+        <a:ln w="6350" cap="flat" cmpd="sng" algn="ctr">
+          <a:solidFill>
+            <a:schemeClr val="phClr"/>
+          </a:solidFill>
+          <a:prstDash val="solid"/>
+          <a:miter lim="800000"/>
+        </a:ln>
+        <a:ln w="12700" cap="flat" cmpd="sng" algn="ctr">
+          <a:solidFill>
+            <a:schemeClr val="phClr"/>
+          </a:solidFill>
+          <a:prstDash val="solid"/>
+          <a:miter lim="800000"/>
+        </a:ln>
+        <a:ln w="19050" cap="flat" cmpd="sng" algn="ctr">
+          <a:solidFill>
+            <a:schemeClr val="phClr"/>
+          </a:solidFill>
+          <a:prstDash val="solid"/>
+          <a:miter lim="800000"/>
+        </a:ln>
+      </a:lnStyleLst>
+      <a:effectStyleLst>
+        <a:effectStyle>
+          <a:effectLst/>
+        </a:effectStyle>
+        <a:effectStyle>
+          <a:effectLst/>
+        </a:effectStyle>
+        <a:effectStyle>
+          <a:effectLst>
+            <a:outerShdw blurRad="57150" dist="19050" dir="5400000" algn="ctr" rotWithShape="0">
+              <a:srgbClr val="000000">
+                <a:alpha val="63000"/>
+              </a:srgbClr>
+            </a:outerShdw>
+          </a:effectLst>
+        </a:effectStyle>
+      </a:effectStyleLst>
+      <a:bgFillStyleLst>
+        <a:solidFill>
+          <a:schemeClr val="phClr"/>
+        </a:solidFill>
+        <a:solidFill>
+          <a:schemeClr val="phClr">
+            <a:tint val="95000"/>
+            <a:satMod val="170000"/>
+          </a:schemeClr>
+        </a:solidFill>
+        <a:gradFill rotWithShape="1">
+          <a:gsLst>
+            <a:gs pos="0">
+              <a:schemeClr val="phClr">
+                <a:tint val="93000"/>
+                <a:satMod val="150000"/>
+                <a:shade val="98000"/>
+                <a:lumMod val="102000"/>
+              </a:schemeClr>
+            </a:gs>
+            <a:gs pos="50000">
+              <a:schemeClr val="phClr">
+                <a:tint val="98000"/>
+                <a:satMod val="130000"/>
+                <a:shade val="90000"/>
+                <a:lumMod val="103000"/>
+              </a:schemeClr>
+            </a:gs>
+            <a:gs pos="100000">
+              <a:schemeClr val="phClr">
+                <a:shade val="63000"/>
+                <a:satMod val="120000"/>
+              </a:schemeClr>
+            </a:gs>
+          </a:gsLst>
+          <a:lin ang="5400000" scaled="0"/>
+        </a:gradFill>
+      </a:bgFillStyleLst>
+    </a:fmtScheme>
+  </a:themeElements>
+  <a:objectDefaults/>
+  <a:extraClrSchemeLst/>
+  <a:extLst>
+    <a:ext uri="{05A4C25C-085E-4340-85A3-A5531E510DB2}">
+      <thm15:themeFamily xmlns:thm15="http://schemas.microsoft.com/office/thememl/2012/main" name="Office Theme" id="{62F939B6-93AF-4DB8-9C6B-D6C7DFDC589F}" vid="{4A3C46E8-61CC-4603-A589-7422A47A8E4A}"/>
+    </a:ext>
+  </a:extLst>
+</a:theme>
 </file>
</xml_diff>